<commit_message>
Update source and ppt
</commit_message>
<xml_diff>
--- a/IoT - 25 - Data Storage MongoDB rev 2.pptx
+++ b/IoT - 25 - Data Storage MongoDB rev 2.pptx
@@ -45,7 +45,15 @@
     <p:sldId id="299" r:id="rId39"/>
     <p:sldId id="300" r:id="rId40"/>
     <p:sldId id="293" r:id="rId41"/>
-    <p:sldId id="257" r:id="rId42"/>
+    <p:sldId id="301" r:id="rId42"/>
+    <p:sldId id="302" r:id="rId43"/>
+    <p:sldId id="303" r:id="rId44"/>
+    <p:sldId id="304" r:id="rId45"/>
+    <p:sldId id="305" r:id="rId46"/>
+    <p:sldId id="306" r:id="rId47"/>
+    <p:sldId id="307" r:id="rId48"/>
+    <p:sldId id="308" r:id="rId49"/>
+    <p:sldId id="257" r:id="rId50"/>
   </p:sldIdLst>
   <p:sldSz cx="9144000" cy="6858000" type="screen4x3"/>
   <p:notesSz cx="6858000" cy="9144000"/>
@@ -192,6 +200,14 @@
             <p14:sldId id="299"/>
             <p14:sldId id="300"/>
             <p14:sldId id="293"/>
+            <p14:sldId id="301"/>
+            <p14:sldId id="302"/>
+            <p14:sldId id="303"/>
+            <p14:sldId id="304"/>
+            <p14:sldId id="305"/>
+            <p14:sldId id="306"/>
+            <p14:sldId id="307"/>
+            <p14:sldId id="308"/>
           </p14:sldIdLst>
         </p14:section>
         <p14:section name="Cover Penutup" id="{92D7BCFF-D3B8-4529-BEB1-5D5A8DBA1A23}">
@@ -2539,7 +2555,7 @@
           <p:cNvPr id="7" name="Picture 6">
             <a:extLst>
               <a:ext uri="{FF2B5EF4-FFF2-40B4-BE49-F238E27FC236}">
-                <a16:creationId xmlns:a16="http://schemas.microsoft.com/office/drawing/2014/main" xmlns="" id="{1CA5F2D1-C77B-4614-B681-5858C9584088}"/>
+                <a16:creationId xmlns="" xmlns:a16="http://schemas.microsoft.com/office/drawing/2014/main" id="{1CA5F2D1-C77B-4614-B681-5858C9584088}"/>
               </a:ext>
             </a:extLst>
           </p:cNvPr>
@@ -2836,7 +2852,7 @@
           <p:cNvPr id="8" name="Picture 7">
             <a:extLst>
               <a:ext uri="{FF2B5EF4-FFF2-40B4-BE49-F238E27FC236}">
-                <a16:creationId xmlns:a16="http://schemas.microsoft.com/office/drawing/2014/main" xmlns="" id="{8EA70F98-D6BF-44D5-864A-E8B8E6EA8A9F}"/>
+                <a16:creationId xmlns="" xmlns:a16="http://schemas.microsoft.com/office/drawing/2014/main" id="{8EA70F98-D6BF-44D5-864A-E8B8E6EA8A9F}"/>
               </a:ext>
             </a:extLst>
           </p:cNvPr>
@@ -2871,7 +2887,7 @@
           <p:cNvPr id="9" name="Rectangle 8">
             <a:extLst>
               <a:ext uri="{FF2B5EF4-FFF2-40B4-BE49-F238E27FC236}">
-                <a16:creationId xmlns:a16="http://schemas.microsoft.com/office/drawing/2014/main" xmlns="" id="{57E39DBC-BF39-4AA8-A8D4-8190CF567658}"/>
+                <a16:creationId xmlns="" xmlns:a16="http://schemas.microsoft.com/office/drawing/2014/main" id="{57E39DBC-BF39-4AA8-A8D4-8190CF567658}"/>
               </a:ext>
             </a:extLst>
           </p:cNvPr>
@@ -2934,7 +2950,7 @@
           <p:cNvPr id="10" name="Picture 9">
             <a:extLst>
               <a:ext uri="{FF2B5EF4-FFF2-40B4-BE49-F238E27FC236}">
-                <a16:creationId xmlns:a16="http://schemas.microsoft.com/office/drawing/2014/main" xmlns="" id="{089B2762-C2F9-4BAC-B1EE-95539397A963}"/>
+                <a16:creationId xmlns="" xmlns:a16="http://schemas.microsoft.com/office/drawing/2014/main" id="{089B2762-C2F9-4BAC-B1EE-95539397A963}"/>
               </a:ext>
             </a:extLst>
           </p:cNvPr>
@@ -2970,7 +2986,7 @@
           <p:cNvPr id="11" name="Group 10">
             <a:extLst>
               <a:ext uri="{FF2B5EF4-FFF2-40B4-BE49-F238E27FC236}">
-                <a16:creationId xmlns:a16="http://schemas.microsoft.com/office/drawing/2014/main" xmlns="" id="{4B60F85D-D540-4735-B378-D7D9225FE7F3}"/>
+                <a16:creationId xmlns="" xmlns:a16="http://schemas.microsoft.com/office/drawing/2014/main" id="{4B60F85D-D540-4735-B378-D7D9225FE7F3}"/>
               </a:ext>
             </a:extLst>
           </p:cNvPr>
@@ -2990,7 +3006,7 @@
             <p:cNvPr id="12" name="Picture 11">
               <a:extLst>
                 <a:ext uri="{FF2B5EF4-FFF2-40B4-BE49-F238E27FC236}">
-                  <a16:creationId xmlns:a16="http://schemas.microsoft.com/office/drawing/2014/main" xmlns="" id="{2CE453EB-EDB4-49CF-90BE-4F74F5C3CE50}"/>
+                  <a16:creationId xmlns="" xmlns:a16="http://schemas.microsoft.com/office/drawing/2014/main" id="{2CE453EB-EDB4-49CF-90BE-4F74F5C3CE50}"/>
                 </a:ext>
               </a:extLst>
             </p:cNvPr>
@@ -3026,7 +3042,7 @@
             <p:cNvPr id="13" name="Title 1">
               <a:extLst>
                 <a:ext uri="{FF2B5EF4-FFF2-40B4-BE49-F238E27FC236}">
-                  <a16:creationId xmlns:a16="http://schemas.microsoft.com/office/drawing/2014/main" xmlns="" id="{73E0DBD7-B92C-4F4C-A59F-F8EF3A4C3876}"/>
+                  <a16:creationId xmlns="" xmlns:a16="http://schemas.microsoft.com/office/drawing/2014/main" id="{73E0DBD7-B92C-4F4C-A59F-F8EF3A4C3876}"/>
                 </a:ext>
               </a:extLst>
             </p:cNvPr>
@@ -3418,7 +3434,7 @@
           <p:cNvPr id="47" name="Picture 46">
             <a:extLst>
               <a:ext uri="{FF2B5EF4-FFF2-40B4-BE49-F238E27FC236}">
-                <a16:creationId xmlns:a16="http://schemas.microsoft.com/office/drawing/2014/main" xmlns="" id="{1CA5F2D1-C77B-4614-B681-5858C9584088}"/>
+                <a16:creationId xmlns="" xmlns:a16="http://schemas.microsoft.com/office/drawing/2014/main" id="{1CA5F2D1-C77B-4614-B681-5858C9584088}"/>
               </a:ext>
             </a:extLst>
           </p:cNvPr>
@@ -3453,7 +3469,7 @@
           <p:cNvPr id="46" name="Group 45">
             <a:extLst>
               <a:ext uri="{FF2B5EF4-FFF2-40B4-BE49-F238E27FC236}">
-                <a16:creationId xmlns:a16="http://schemas.microsoft.com/office/drawing/2014/main" xmlns="" id="{4B60F85D-D540-4735-B378-D7D9225FE7F3}"/>
+                <a16:creationId xmlns="" xmlns:a16="http://schemas.microsoft.com/office/drawing/2014/main" id="{4B60F85D-D540-4735-B378-D7D9225FE7F3}"/>
               </a:ext>
             </a:extLst>
           </p:cNvPr>
@@ -3473,7 +3489,7 @@
             <p:cNvPr id="34" name="Picture 33">
               <a:extLst>
                 <a:ext uri="{FF2B5EF4-FFF2-40B4-BE49-F238E27FC236}">
-                  <a16:creationId xmlns:a16="http://schemas.microsoft.com/office/drawing/2014/main" xmlns="" id="{2CE453EB-EDB4-49CF-90BE-4F74F5C3CE50}"/>
+                  <a16:creationId xmlns="" xmlns:a16="http://schemas.microsoft.com/office/drawing/2014/main" id="{2CE453EB-EDB4-49CF-90BE-4F74F5C3CE50}"/>
                 </a:ext>
               </a:extLst>
             </p:cNvPr>
@@ -3509,7 +3525,7 @@
             <p:cNvPr id="37" name="Title 1">
               <a:extLst>
                 <a:ext uri="{FF2B5EF4-FFF2-40B4-BE49-F238E27FC236}">
-                  <a16:creationId xmlns:a16="http://schemas.microsoft.com/office/drawing/2014/main" xmlns="" id="{73E0DBD7-B92C-4F4C-A59F-F8EF3A4C3876}"/>
+                  <a16:creationId xmlns="" xmlns:a16="http://schemas.microsoft.com/office/drawing/2014/main" id="{73E0DBD7-B92C-4F4C-A59F-F8EF3A4C3876}"/>
                 </a:ext>
               </a:extLst>
             </p:cNvPr>
@@ -3580,7 +3596,7 @@
           <p:cNvPr id="17" name="Title 1">
             <a:extLst>
               <a:ext uri="{FF2B5EF4-FFF2-40B4-BE49-F238E27FC236}">
-                <a16:creationId xmlns:a16="http://schemas.microsoft.com/office/drawing/2014/main" xmlns="" id="{FE488684-4B91-45E0-AC48-E54C1020FB09}"/>
+                <a16:creationId xmlns="" xmlns:a16="http://schemas.microsoft.com/office/drawing/2014/main" id="{FE488684-4B91-45E0-AC48-E54C1020FB09}"/>
               </a:ext>
             </a:extLst>
           </p:cNvPr>
@@ -3819,7 +3835,7 @@
           <p:cNvPr id="2" name="Title 1">
             <a:extLst>
               <a:ext uri="{FF2B5EF4-FFF2-40B4-BE49-F238E27FC236}">
-                <a16:creationId xmlns:a16="http://schemas.microsoft.com/office/drawing/2014/main" xmlns="" id="{1C67D1DA-C53D-46C8-AA6C-6F813EECD6D9}"/>
+                <a16:creationId xmlns="" xmlns:a16="http://schemas.microsoft.com/office/drawing/2014/main" id="{1C67D1DA-C53D-46C8-AA6C-6F813EECD6D9}"/>
               </a:ext>
             </a:extLst>
           </p:cNvPr>
@@ -3847,7 +3863,7 @@
           <p:cNvPr id="3" name="Content Placeholder 2">
             <a:extLst>
               <a:ext uri="{FF2B5EF4-FFF2-40B4-BE49-F238E27FC236}">
-                <a16:creationId xmlns:a16="http://schemas.microsoft.com/office/drawing/2014/main" xmlns="" id="{FDE4BADA-A521-4FC9-BF24-CCC5CB163098}"/>
+                <a16:creationId xmlns="" xmlns:a16="http://schemas.microsoft.com/office/drawing/2014/main" id="{FDE4BADA-A521-4FC9-BF24-CCC5CB163098}"/>
               </a:ext>
             </a:extLst>
           </p:cNvPr>
@@ -3878,7 +3894,7 @@
           <p:cNvPr id="5" name="Graphic 4">
             <a:extLst>
               <a:ext uri="{FF2B5EF4-FFF2-40B4-BE49-F238E27FC236}">
-                <a16:creationId xmlns:a16="http://schemas.microsoft.com/office/drawing/2014/main" xmlns="" id="{A7FCB32C-E526-4E97-8B91-7FC87CFECADF}"/>
+                <a16:creationId xmlns="" xmlns:a16="http://schemas.microsoft.com/office/drawing/2014/main" id="{A7FCB32C-E526-4E97-8B91-7FC87CFECADF}"/>
               </a:ext>
             </a:extLst>
           </p:cNvPr>
@@ -3894,7 +3910,7 @@
                 <a14:useLocalDpi xmlns:a14="http://schemas.microsoft.com/office/drawing/2010/main" val="0"/>
               </a:ext>
               <a:ext uri="{96DAC541-7B7A-43D3-8B79-37D633B846F1}">
-                <asvg:svgBlip xmlns:asvg="http://schemas.microsoft.com/office/drawing/2016/SVG/main" xmlns="" r:embed="rId3"/>
+                <asvg:svgBlip xmlns="" xmlns:asvg="http://schemas.microsoft.com/office/drawing/2016/SVG/main" r:embed="rId3"/>
               </a:ext>
             </a:extLst>
           </a:blip>
@@ -3954,7 +3970,7 @@
           <p:cNvPr id="2" name="Title 1">
             <a:extLst>
               <a:ext uri="{FF2B5EF4-FFF2-40B4-BE49-F238E27FC236}">
-                <a16:creationId xmlns:a16="http://schemas.microsoft.com/office/drawing/2014/main" xmlns="" id="{56E1825C-1D29-41AE-9354-AC8A27FE09D4}"/>
+                <a16:creationId xmlns="" xmlns:a16="http://schemas.microsoft.com/office/drawing/2014/main" id="{56E1825C-1D29-41AE-9354-AC8A27FE09D4}"/>
               </a:ext>
             </a:extLst>
           </p:cNvPr>
@@ -3982,7 +3998,7 @@
           <p:cNvPr id="3" name="Content Placeholder 2">
             <a:extLst>
               <a:ext uri="{FF2B5EF4-FFF2-40B4-BE49-F238E27FC236}">
-                <a16:creationId xmlns:a16="http://schemas.microsoft.com/office/drawing/2014/main" xmlns="" id="{CD4BCC17-F9E0-4CE5-9781-94E7744EB419}"/>
+                <a16:creationId xmlns="" xmlns:a16="http://schemas.microsoft.com/office/drawing/2014/main" id="{CD4BCC17-F9E0-4CE5-9781-94E7744EB419}"/>
               </a:ext>
             </a:extLst>
           </p:cNvPr>
@@ -4056,7 +4072,7 @@
           <p:cNvPr id="5" name="Picture 4">
             <a:extLst>
               <a:ext uri="{FF2B5EF4-FFF2-40B4-BE49-F238E27FC236}">
-                <a16:creationId xmlns:a16="http://schemas.microsoft.com/office/drawing/2014/main" xmlns="" id="{659B503B-A475-49B2-9D08-752DDB70AE92}"/>
+                <a16:creationId xmlns="" xmlns:a16="http://schemas.microsoft.com/office/drawing/2014/main" id="{659B503B-A475-49B2-9D08-752DDB70AE92}"/>
               </a:ext>
             </a:extLst>
           </p:cNvPr>
@@ -4123,7 +4139,7 @@
           <p:cNvPr id="2" name="Title 1">
             <a:extLst>
               <a:ext uri="{FF2B5EF4-FFF2-40B4-BE49-F238E27FC236}">
-                <a16:creationId xmlns:a16="http://schemas.microsoft.com/office/drawing/2014/main" xmlns="" id="{DE444882-0FA2-4B31-A724-9A00FA7E36B9}"/>
+                <a16:creationId xmlns="" xmlns:a16="http://schemas.microsoft.com/office/drawing/2014/main" id="{DE444882-0FA2-4B31-A724-9A00FA7E36B9}"/>
               </a:ext>
             </a:extLst>
           </p:cNvPr>
@@ -4151,7 +4167,7 @@
           <p:cNvPr id="3" name="Content Placeholder 2">
             <a:extLst>
               <a:ext uri="{FF2B5EF4-FFF2-40B4-BE49-F238E27FC236}">
-                <a16:creationId xmlns:a16="http://schemas.microsoft.com/office/drawing/2014/main" xmlns="" id="{F6E53B8C-FA82-4CDA-AD3F-9954F4816C1A}"/>
+                <a16:creationId xmlns="" xmlns:a16="http://schemas.microsoft.com/office/drawing/2014/main" id="{F6E53B8C-FA82-4CDA-AD3F-9954F4816C1A}"/>
               </a:ext>
             </a:extLst>
           </p:cNvPr>
@@ -4216,7 +4232,7 @@
           <p:cNvPr id="2" name="Title 1">
             <a:extLst>
               <a:ext uri="{FF2B5EF4-FFF2-40B4-BE49-F238E27FC236}">
-                <a16:creationId xmlns:a16="http://schemas.microsoft.com/office/drawing/2014/main" xmlns="" id="{C02037FB-E1BD-4613-97DE-8D893EA12959}"/>
+                <a16:creationId xmlns="" xmlns:a16="http://schemas.microsoft.com/office/drawing/2014/main" id="{C02037FB-E1BD-4613-97DE-8D893EA12959}"/>
               </a:ext>
             </a:extLst>
           </p:cNvPr>
@@ -4244,7 +4260,7 @@
           <p:cNvPr id="3" name="Content Placeholder 2">
             <a:extLst>
               <a:ext uri="{FF2B5EF4-FFF2-40B4-BE49-F238E27FC236}">
-                <a16:creationId xmlns:a16="http://schemas.microsoft.com/office/drawing/2014/main" xmlns="" id="{456E7979-18E8-4643-A646-770229555E83}"/>
+                <a16:creationId xmlns="" xmlns:a16="http://schemas.microsoft.com/office/drawing/2014/main" id="{456E7979-18E8-4643-A646-770229555E83}"/>
               </a:ext>
             </a:extLst>
           </p:cNvPr>
@@ -4440,7 +4456,7 @@
           <p:cNvPr id="2" name="Title 1">
             <a:extLst>
               <a:ext uri="{FF2B5EF4-FFF2-40B4-BE49-F238E27FC236}">
-                <a16:creationId xmlns:a16="http://schemas.microsoft.com/office/drawing/2014/main" xmlns="" id="{FD51DCB0-B618-4804-B87F-EE9D063C6A84}"/>
+                <a16:creationId xmlns="" xmlns:a16="http://schemas.microsoft.com/office/drawing/2014/main" id="{FD51DCB0-B618-4804-B87F-EE9D063C6A84}"/>
               </a:ext>
             </a:extLst>
           </p:cNvPr>
@@ -4468,7 +4484,7 @@
           <p:cNvPr id="4" name="Content Placeholder 3">
             <a:extLst>
               <a:ext uri="{FF2B5EF4-FFF2-40B4-BE49-F238E27FC236}">
-                <a16:creationId xmlns:a16="http://schemas.microsoft.com/office/drawing/2014/main" xmlns="" id="{3D38F512-9850-4C5B-999A-2B3FB5F7A429}"/>
+                <a16:creationId xmlns="" xmlns:a16="http://schemas.microsoft.com/office/drawing/2014/main" id="{3D38F512-9850-4C5B-999A-2B3FB5F7A429}"/>
               </a:ext>
             </a:extLst>
           </p:cNvPr>
@@ -4537,7 +4553,7 @@
           <p:cNvPr id="2" name="Title 1">
             <a:extLst>
               <a:ext uri="{FF2B5EF4-FFF2-40B4-BE49-F238E27FC236}">
-                <a16:creationId xmlns:a16="http://schemas.microsoft.com/office/drawing/2014/main" xmlns="" id="{C8F1F82F-6107-4E2F-9CBA-5385B052CEA0}"/>
+                <a16:creationId xmlns="" xmlns:a16="http://schemas.microsoft.com/office/drawing/2014/main" id="{C8F1F82F-6107-4E2F-9CBA-5385B052CEA0}"/>
               </a:ext>
             </a:extLst>
           </p:cNvPr>
@@ -4565,7 +4581,7 @@
           <p:cNvPr id="3" name="Content Placeholder 2">
             <a:extLst>
               <a:ext uri="{FF2B5EF4-FFF2-40B4-BE49-F238E27FC236}">
-                <a16:creationId xmlns:a16="http://schemas.microsoft.com/office/drawing/2014/main" xmlns="" id="{9EC4817C-1E65-41B4-A681-27E2905F5540}"/>
+                <a16:creationId xmlns="" xmlns:a16="http://schemas.microsoft.com/office/drawing/2014/main" id="{9EC4817C-1E65-41B4-A681-27E2905F5540}"/>
               </a:ext>
             </a:extLst>
           </p:cNvPr>
@@ -4707,7 +4723,7 @@
           <p:cNvPr id="2" name="Title 1">
             <a:extLst>
               <a:ext uri="{FF2B5EF4-FFF2-40B4-BE49-F238E27FC236}">
-                <a16:creationId xmlns:a16="http://schemas.microsoft.com/office/drawing/2014/main" xmlns="" id="{4B429859-9367-4570-9498-0DEF86297E9C}"/>
+                <a16:creationId xmlns="" xmlns:a16="http://schemas.microsoft.com/office/drawing/2014/main" id="{4B429859-9367-4570-9498-0DEF86297E9C}"/>
               </a:ext>
             </a:extLst>
           </p:cNvPr>
@@ -4739,7 +4755,7 @@
           <p:cNvPr id="4" name="table">
             <a:extLst>
               <a:ext uri="{FF2B5EF4-FFF2-40B4-BE49-F238E27FC236}">
-                <a16:creationId xmlns:a16="http://schemas.microsoft.com/office/drawing/2014/main" xmlns="" id="{D125BCF3-D06C-4743-BBBF-18E92C1A35ED}"/>
+                <a16:creationId xmlns="" xmlns:a16="http://schemas.microsoft.com/office/drawing/2014/main" id="{D125BCF3-D06C-4743-BBBF-18E92C1A35ED}"/>
               </a:ext>
             </a:extLst>
           </p:cNvPr>
@@ -4808,7 +4824,7 @@
           <p:cNvPr id="2" name="Title 1">
             <a:extLst>
               <a:ext uri="{FF2B5EF4-FFF2-40B4-BE49-F238E27FC236}">
-                <a16:creationId xmlns:a16="http://schemas.microsoft.com/office/drawing/2014/main" xmlns="" id="{8FC29446-F776-4AEF-97A8-6B0448490FCF}"/>
+                <a16:creationId xmlns="" xmlns:a16="http://schemas.microsoft.com/office/drawing/2014/main" id="{8FC29446-F776-4AEF-97A8-6B0448490FCF}"/>
               </a:ext>
             </a:extLst>
           </p:cNvPr>
@@ -4839,7 +4855,7 @@
           <p:cNvPr id="3" name="Content Placeholder 2">
             <a:extLst>
               <a:ext uri="{FF2B5EF4-FFF2-40B4-BE49-F238E27FC236}">
-                <a16:creationId xmlns:a16="http://schemas.microsoft.com/office/drawing/2014/main" xmlns="" id="{B06B9289-AB87-4C2B-8654-D4B5B3D9D4CE}"/>
+                <a16:creationId xmlns="" xmlns:a16="http://schemas.microsoft.com/office/drawing/2014/main" id="{B06B9289-AB87-4C2B-8654-D4B5B3D9D4CE}"/>
               </a:ext>
             </a:extLst>
           </p:cNvPr>
@@ -4988,7 +5004,7 @@
           <p:cNvPr id="2" name="Title 1">
             <a:extLst>
               <a:ext uri="{FF2B5EF4-FFF2-40B4-BE49-F238E27FC236}">
-                <a16:creationId xmlns:a16="http://schemas.microsoft.com/office/drawing/2014/main" xmlns="" id="{82F22EE1-31C3-4FD0-9540-26B9C8371327}"/>
+                <a16:creationId xmlns="" xmlns:a16="http://schemas.microsoft.com/office/drawing/2014/main" id="{82F22EE1-31C3-4FD0-9540-26B9C8371327}"/>
               </a:ext>
             </a:extLst>
           </p:cNvPr>
@@ -5016,7 +5032,7 @@
           <p:cNvPr id="3" name="Content Placeholder 2">
             <a:extLst>
               <a:ext uri="{FF2B5EF4-FFF2-40B4-BE49-F238E27FC236}">
-                <a16:creationId xmlns:a16="http://schemas.microsoft.com/office/drawing/2014/main" xmlns="" id="{FD947C67-7864-4C2D-A2B2-9088A0753D59}"/>
+                <a16:creationId xmlns="" xmlns:a16="http://schemas.microsoft.com/office/drawing/2014/main" id="{FD947C67-7864-4C2D-A2B2-9088A0753D59}"/>
               </a:ext>
             </a:extLst>
           </p:cNvPr>
@@ -5264,7 +5280,7 @@
           <p:cNvPr id="2" name="Title 1">
             <a:extLst>
               <a:ext uri="{FF2B5EF4-FFF2-40B4-BE49-F238E27FC236}">
-                <a16:creationId xmlns:a16="http://schemas.microsoft.com/office/drawing/2014/main" xmlns="" id="{ED83B707-5481-47C7-9985-9EF390CD429E}"/>
+                <a16:creationId xmlns="" xmlns:a16="http://schemas.microsoft.com/office/drawing/2014/main" id="{ED83B707-5481-47C7-9985-9EF390CD429E}"/>
               </a:ext>
             </a:extLst>
           </p:cNvPr>
@@ -5292,7 +5308,7 @@
           <p:cNvPr id="3" name="Content Placeholder 2">
             <a:extLst>
               <a:ext uri="{FF2B5EF4-FFF2-40B4-BE49-F238E27FC236}">
-                <a16:creationId xmlns:a16="http://schemas.microsoft.com/office/drawing/2014/main" xmlns="" id="{F306329B-C40A-4112-ACB0-D860F96DAECC}"/>
+                <a16:creationId xmlns="" xmlns:a16="http://schemas.microsoft.com/office/drawing/2014/main" id="{F306329B-C40A-4112-ACB0-D860F96DAECC}"/>
               </a:ext>
             </a:extLst>
           </p:cNvPr>
@@ -5533,7 +5549,7 @@
           <p:cNvPr id="2" name="Title 1">
             <a:extLst>
               <a:ext uri="{FF2B5EF4-FFF2-40B4-BE49-F238E27FC236}">
-                <a16:creationId xmlns:a16="http://schemas.microsoft.com/office/drawing/2014/main" xmlns="" id="{E746D023-9F06-43EF-9763-2212EE8EB9C4}"/>
+                <a16:creationId xmlns="" xmlns:a16="http://schemas.microsoft.com/office/drawing/2014/main" id="{E746D023-9F06-43EF-9763-2212EE8EB9C4}"/>
               </a:ext>
             </a:extLst>
           </p:cNvPr>
@@ -5561,7 +5577,7 @@
           <p:cNvPr id="5" name="Rectangle 2">
             <a:extLst>
               <a:ext uri="{FF2B5EF4-FFF2-40B4-BE49-F238E27FC236}">
-                <a16:creationId xmlns:a16="http://schemas.microsoft.com/office/drawing/2014/main" xmlns="" id="{48B4AA4D-DAD0-4E2E-86DE-49363BE8FEAB}"/>
+                <a16:creationId xmlns="" xmlns:a16="http://schemas.microsoft.com/office/drawing/2014/main" id="{48B4AA4D-DAD0-4E2E-86DE-49363BE8FEAB}"/>
               </a:ext>
             </a:extLst>
           </p:cNvPr>
@@ -5962,7 +5978,7 @@
           <p:cNvPr id="7" name="Graphic 6">
             <a:extLst>
               <a:ext uri="{FF2B5EF4-FFF2-40B4-BE49-F238E27FC236}">
-                <a16:creationId xmlns:a16="http://schemas.microsoft.com/office/drawing/2014/main" xmlns="" id="{E67FBEDA-8700-4287-BFB7-BA5505321175}"/>
+                <a16:creationId xmlns="" xmlns:a16="http://schemas.microsoft.com/office/drawing/2014/main" id="{E67FBEDA-8700-4287-BFB7-BA5505321175}"/>
               </a:ext>
             </a:extLst>
           </p:cNvPr>
@@ -5978,7 +5994,7 @@
                 <a14:useLocalDpi xmlns:a14="http://schemas.microsoft.com/office/drawing/2010/main" val="0"/>
               </a:ext>
               <a:ext uri="{96DAC541-7B7A-43D3-8B79-37D633B846F1}">
-                <asvg:svgBlip xmlns:asvg="http://schemas.microsoft.com/office/drawing/2016/SVG/main" xmlns="" r:embed="rId8"/>
+                <asvg:svgBlip xmlns="" xmlns:asvg="http://schemas.microsoft.com/office/drawing/2016/SVG/main" r:embed="rId8"/>
               </a:ext>
             </a:extLst>
           </a:blip>
@@ -6038,7 +6054,7 @@
           <p:cNvPr id="2" name="Title 1">
             <a:extLst>
               <a:ext uri="{FF2B5EF4-FFF2-40B4-BE49-F238E27FC236}">
-                <a16:creationId xmlns:a16="http://schemas.microsoft.com/office/drawing/2014/main" xmlns="" id="{EEA19F16-C7C6-4C7D-AB51-8DCD44F485D3}"/>
+                <a16:creationId xmlns="" xmlns:a16="http://schemas.microsoft.com/office/drawing/2014/main" id="{EEA19F16-C7C6-4C7D-AB51-8DCD44F485D3}"/>
               </a:ext>
             </a:extLst>
           </p:cNvPr>
@@ -6066,7 +6082,7 @@
           <p:cNvPr id="4" name="Rectangle 1">
             <a:extLst>
               <a:ext uri="{FF2B5EF4-FFF2-40B4-BE49-F238E27FC236}">
-                <a16:creationId xmlns:a16="http://schemas.microsoft.com/office/drawing/2014/main" xmlns="" id="{44C8D592-48CE-4981-A17C-C726BF4C8E86}"/>
+                <a16:creationId xmlns="" xmlns:a16="http://schemas.microsoft.com/office/drawing/2014/main" id="{44C8D592-48CE-4981-A17C-C726BF4C8E86}"/>
               </a:ext>
             </a:extLst>
           </p:cNvPr>
@@ -6348,7 +6364,7 @@
           <p:cNvPr id="7" name="Graphic 6">
             <a:extLst>
               <a:ext uri="{FF2B5EF4-FFF2-40B4-BE49-F238E27FC236}">
-                <a16:creationId xmlns:a16="http://schemas.microsoft.com/office/drawing/2014/main" xmlns="" id="{97FD483C-F6C6-48FC-B1B8-A5FE1E1CDE3E}"/>
+                <a16:creationId xmlns="" xmlns:a16="http://schemas.microsoft.com/office/drawing/2014/main" id="{97FD483C-F6C6-48FC-B1B8-A5FE1E1CDE3E}"/>
               </a:ext>
             </a:extLst>
           </p:cNvPr>
@@ -6364,7 +6380,7 @@
                 <a14:useLocalDpi xmlns:a14="http://schemas.microsoft.com/office/drawing/2010/main" val="0"/>
               </a:ext>
               <a:ext uri="{96DAC541-7B7A-43D3-8B79-37D633B846F1}">
-                <asvg:svgBlip xmlns:asvg="http://schemas.microsoft.com/office/drawing/2016/SVG/main" xmlns="" r:embed="rId7"/>
+                <asvg:svgBlip xmlns="" xmlns:asvg="http://schemas.microsoft.com/office/drawing/2016/SVG/main" r:embed="rId7"/>
               </a:ext>
             </a:extLst>
           </a:blip>
@@ -6424,7 +6440,7 @@
           <p:cNvPr id="2" name="Title 1">
             <a:extLst>
               <a:ext uri="{FF2B5EF4-FFF2-40B4-BE49-F238E27FC236}">
-                <a16:creationId xmlns:a16="http://schemas.microsoft.com/office/drawing/2014/main" xmlns="" id="{C8EDF54B-FFCE-4390-8614-246563ED3322}"/>
+                <a16:creationId xmlns="" xmlns:a16="http://schemas.microsoft.com/office/drawing/2014/main" id="{C8EDF54B-FFCE-4390-8614-246563ED3322}"/>
               </a:ext>
             </a:extLst>
           </p:cNvPr>
@@ -6452,7 +6468,7 @@
           <p:cNvPr id="5" name="Content Placeholder 4">
             <a:extLst>
               <a:ext uri="{FF2B5EF4-FFF2-40B4-BE49-F238E27FC236}">
-                <a16:creationId xmlns:a16="http://schemas.microsoft.com/office/drawing/2014/main" xmlns="" id="{3FF09D27-74E4-44E6-AC31-7DB3CD0464A2}"/>
+                <a16:creationId xmlns="" xmlns:a16="http://schemas.microsoft.com/office/drawing/2014/main" id="{3FF09D27-74E4-44E6-AC31-7DB3CD0464A2}"/>
               </a:ext>
             </a:extLst>
           </p:cNvPr>
@@ -6470,7 +6486,7 @@
                 <a14:useLocalDpi xmlns:a14="http://schemas.microsoft.com/office/drawing/2010/main" val="0"/>
               </a:ext>
               <a:ext uri="{96DAC541-7B7A-43D3-8B79-37D633B846F1}">
-                <asvg:svgBlip xmlns:asvg="http://schemas.microsoft.com/office/drawing/2016/SVG/main" xmlns="" r:embed="rId3"/>
+                <asvg:svgBlip xmlns="" xmlns:asvg="http://schemas.microsoft.com/office/drawing/2016/SVG/main" r:embed="rId3"/>
               </a:ext>
             </a:extLst>
           </a:blip>
@@ -6527,7 +6543,7 @@
           <p:cNvPr id="2" name="Title 1">
             <a:extLst>
               <a:ext uri="{FF2B5EF4-FFF2-40B4-BE49-F238E27FC236}">
-                <a16:creationId xmlns:a16="http://schemas.microsoft.com/office/drawing/2014/main" xmlns="" id="{5109D25F-67DD-4DE0-945B-48B3A0D9F783}"/>
+                <a16:creationId xmlns="" xmlns:a16="http://schemas.microsoft.com/office/drawing/2014/main" id="{5109D25F-67DD-4DE0-945B-48B3A0D9F783}"/>
               </a:ext>
             </a:extLst>
           </p:cNvPr>
@@ -6555,7 +6571,7 @@
           <p:cNvPr id="5" name="Content Placeholder 4">
             <a:extLst>
               <a:ext uri="{FF2B5EF4-FFF2-40B4-BE49-F238E27FC236}">
-                <a16:creationId xmlns:a16="http://schemas.microsoft.com/office/drawing/2014/main" xmlns="" id="{7F971E9E-5DE5-461F-B192-C2DE7140178F}"/>
+                <a16:creationId xmlns="" xmlns:a16="http://schemas.microsoft.com/office/drawing/2014/main" id="{7F971E9E-5DE5-461F-B192-C2DE7140178F}"/>
               </a:ext>
             </a:extLst>
           </p:cNvPr>
@@ -6573,7 +6589,7 @@
                 <a14:useLocalDpi xmlns:a14="http://schemas.microsoft.com/office/drawing/2010/main" val="0"/>
               </a:ext>
               <a:ext uri="{96DAC541-7B7A-43D3-8B79-37D633B846F1}">
-                <asvg:svgBlip xmlns:asvg="http://schemas.microsoft.com/office/drawing/2016/SVG/main" xmlns="" r:embed="rId3"/>
+                <asvg:svgBlip xmlns="" xmlns:asvg="http://schemas.microsoft.com/office/drawing/2016/SVG/main" r:embed="rId3"/>
               </a:ext>
             </a:extLst>
           </a:blip>
@@ -6593,7 +6609,7 @@
           <p:cNvPr id="7" name="Rectangle 2">
             <a:extLst>
               <a:ext uri="{FF2B5EF4-FFF2-40B4-BE49-F238E27FC236}">
-                <a16:creationId xmlns:a16="http://schemas.microsoft.com/office/drawing/2014/main" xmlns="" id="{5D64124A-397E-4A40-A1CD-7B76A17E5338}"/>
+                <a16:creationId xmlns="" xmlns:a16="http://schemas.microsoft.com/office/drawing/2014/main" id="{5D64124A-397E-4A40-A1CD-7B76A17E5338}"/>
               </a:ext>
             </a:extLst>
           </p:cNvPr>
@@ -7038,7 +7054,7 @@
           <p:cNvPr id="2" name="Title 1">
             <a:extLst>
               <a:ext uri="{FF2B5EF4-FFF2-40B4-BE49-F238E27FC236}">
-                <a16:creationId xmlns:a16="http://schemas.microsoft.com/office/drawing/2014/main" xmlns="" id="{23B91113-2754-4D98-9DFE-4F753C52470B}"/>
+                <a16:creationId xmlns="" xmlns:a16="http://schemas.microsoft.com/office/drawing/2014/main" id="{23B91113-2754-4D98-9DFE-4F753C52470B}"/>
               </a:ext>
             </a:extLst>
           </p:cNvPr>
@@ -7066,7 +7082,7 @@
           <p:cNvPr id="4" name="Content Placeholder 3">
             <a:extLst>
               <a:ext uri="{FF2B5EF4-FFF2-40B4-BE49-F238E27FC236}">
-                <a16:creationId xmlns:a16="http://schemas.microsoft.com/office/drawing/2014/main" xmlns="" id="{199EFA8E-F77E-4937-8F24-BF4C5E303FA9}"/>
+                <a16:creationId xmlns="" xmlns:a16="http://schemas.microsoft.com/office/drawing/2014/main" id="{199EFA8E-F77E-4937-8F24-BF4C5E303FA9}"/>
               </a:ext>
             </a:extLst>
           </p:cNvPr>
@@ -7094,14 +7110,14 @@
                 <a:gridCol w="4257675">
                   <a:extLst>
                     <a:ext uri="{9D8B030D-6E8A-4147-A177-3AD203B41FA5}">
-                      <a16:colId xmlns:a16="http://schemas.microsoft.com/office/drawing/2014/main" xmlns="" val="2885915678"/>
+                      <a16:colId xmlns="" xmlns:a16="http://schemas.microsoft.com/office/drawing/2014/main" val="2885915678"/>
                     </a:ext>
                   </a:extLst>
                 </a:gridCol>
                 <a:gridCol w="4257675">
                   <a:extLst>
                     <a:ext uri="{9D8B030D-6E8A-4147-A177-3AD203B41FA5}">
-                      <a16:colId xmlns:a16="http://schemas.microsoft.com/office/drawing/2014/main" xmlns="" val="2374685223"/>
+                      <a16:colId xmlns="" xmlns:a16="http://schemas.microsoft.com/office/drawing/2014/main" val="2374685223"/>
                     </a:ext>
                   </a:extLst>
                 </a:gridCol>
@@ -7161,7 +7177,7 @@
                 </a:tc>
                 <a:extLst>
                   <a:ext uri="{0D108BD9-81ED-4DB2-BD59-A6C34878D82A}">
-                    <a16:rowId xmlns:a16="http://schemas.microsoft.com/office/drawing/2014/main" xmlns="" val="2730400303"/>
+                    <a16:rowId xmlns="" xmlns:a16="http://schemas.microsoft.com/office/drawing/2014/main" val="2730400303"/>
                   </a:ext>
                 </a:extLst>
               </a:tr>
@@ -7303,7 +7319,7 @@
                 </a:tc>
                 <a:extLst>
                   <a:ext uri="{0D108BD9-81ED-4DB2-BD59-A6C34878D82A}">
-                    <a16:rowId xmlns:a16="http://schemas.microsoft.com/office/drawing/2014/main" xmlns="" val="3395368780"/>
+                    <a16:rowId xmlns="" xmlns:a16="http://schemas.microsoft.com/office/drawing/2014/main" val="3395368780"/>
                   </a:ext>
                 </a:extLst>
               </a:tr>
@@ -7353,7 +7369,7 @@
           <p:cNvPr id="2" name="Title 1">
             <a:extLst>
               <a:ext uri="{FF2B5EF4-FFF2-40B4-BE49-F238E27FC236}">
-                <a16:creationId xmlns:a16="http://schemas.microsoft.com/office/drawing/2014/main" xmlns="" id="{7E08A75C-E31A-4B88-8E35-1C27D2A39F1C}"/>
+                <a16:creationId xmlns="" xmlns:a16="http://schemas.microsoft.com/office/drawing/2014/main" id="{7E08A75C-E31A-4B88-8E35-1C27D2A39F1C}"/>
               </a:ext>
             </a:extLst>
           </p:cNvPr>
@@ -7381,7 +7397,7 @@
           <p:cNvPr id="4" name="Content Placeholder 3">
             <a:extLst>
               <a:ext uri="{FF2B5EF4-FFF2-40B4-BE49-F238E27FC236}">
-                <a16:creationId xmlns:a16="http://schemas.microsoft.com/office/drawing/2014/main" xmlns="" id="{CED2F009-8035-43C0-84ED-B8373711789A}"/>
+                <a16:creationId xmlns="" xmlns:a16="http://schemas.microsoft.com/office/drawing/2014/main" id="{CED2F009-8035-43C0-84ED-B8373711789A}"/>
               </a:ext>
             </a:extLst>
           </p:cNvPr>
@@ -7409,14 +7425,14 @@
                 <a:gridCol w="4391025">
                   <a:extLst>
                     <a:ext uri="{9D8B030D-6E8A-4147-A177-3AD203B41FA5}">
-                      <a16:colId xmlns:a16="http://schemas.microsoft.com/office/drawing/2014/main" xmlns="" val="3712593211"/>
+                      <a16:colId xmlns="" xmlns:a16="http://schemas.microsoft.com/office/drawing/2014/main" val="3712593211"/>
                     </a:ext>
                   </a:extLst>
                 </a:gridCol>
                 <a:gridCol w="4391025">
                   <a:extLst>
                     <a:ext uri="{9D8B030D-6E8A-4147-A177-3AD203B41FA5}">
-                      <a16:colId xmlns:a16="http://schemas.microsoft.com/office/drawing/2014/main" xmlns="" val="4031526278"/>
+                      <a16:colId xmlns="" xmlns:a16="http://schemas.microsoft.com/office/drawing/2014/main" val="4031526278"/>
                     </a:ext>
                   </a:extLst>
                 </a:gridCol>
@@ -7479,7 +7495,7 @@
                 </a:tc>
                 <a:extLst>
                   <a:ext uri="{0D108BD9-81ED-4DB2-BD59-A6C34878D82A}">
-                    <a16:rowId xmlns:a16="http://schemas.microsoft.com/office/drawing/2014/main" xmlns="" val="1506935923"/>
+                    <a16:rowId xmlns="" xmlns:a16="http://schemas.microsoft.com/office/drawing/2014/main" val="1506935923"/>
                   </a:ext>
                 </a:extLst>
               </a:tr>
@@ -7560,7 +7576,7 @@
                 </a:tc>
                 <a:extLst>
                   <a:ext uri="{0D108BD9-81ED-4DB2-BD59-A6C34878D82A}">
-                    <a16:rowId xmlns:a16="http://schemas.microsoft.com/office/drawing/2014/main" xmlns="" val="1217019504"/>
+                    <a16:rowId xmlns="" xmlns:a16="http://schemas.microsoft.com/office/drawing/2014/main" val="1217019504"/>
                   </a:ext>
                 </a:extLst>
               </a:tr>
@@ -7629,7 +7645,7 @@
                 </a:tc>
                 <a:extLst>
                   <a:ext uri="{0D108BD9-81ED-4DB2-BD59-A6C34878D82A}">
-                    <a16:rowId xmlns:a16="http://schemas.microsoft.com/office/drawing/2014/main" xmlns="" val="3584700951"/>
+                    <a16:rowId xmlns="" xmlns:a16="http://schemas.microsoft.com/office/drawing/2014/main" val="3584700951"/>
                   </a:ext>
                 </a:extLst>
               </a:tr>
@@ -7679,7 +7695,7 @@
           <p:cNvPr id="2" name="Title 1">
             <a:extLst>
               <a:ext uri="{FF2B5EF4-FFF2-40B4-BE49-F238E27FC236}">
-                <a16:creationId xmlns:a16="http://schemas.microsoft.com/office/drawing/2014/main" xmlns="" id="{DCE6A171-3E37-4C7A-BCE4-58EC39743ECB}"/>
+                <a16:creationId xmlns="" xmlns:a16="http://schemas.microsoft.com/office/drawing/2014/main" id="{DCE6A171-3E37-4C7A-BCE4-58EC39743ECB}"/>
               </a:ext>
             </a:extLst>
           </p:cNvPr>
@@ -7707,7 +7723,7 @@
           <p:cNvPr id="3" name="Content Placeholder 2">
             <a:extLst>
               <a:ext uri="{FF2B5EF4-FFF2-40B4-BE49-F238E27FC236}">
-                <a16:creationId xmlns:a16="http://schemas.microsoft.com/office/drawing/2014/main" xmlns="" id="{352B4D65-6957-4B56-BE29-004BF719528D}"/>
+                <a16:creationId xmlns="" xmlns:a16="http://schemas.microsoft.com/office/drawing/2014/main" id="{352B4D65-6957-4B56-BE29-004BF719528D}"/>
               </a:ext>
             </a:extLst>
           </p:cNvPr>
@@ -7873,7 +7889,7 @@
           <p:cNvPr id="2" name="Title 1">
             <a:extLst>
               <a:ext uri="{FF2B5EF4-FFF2-40B4-BE49-F238E27FC236}">
-                <a16:creationId xmlns:a16="http://schemas.microsoft.com/office/drawing/2014/main" xmlns="" id="{FA81E0D3-9A1D-4C62-8928-407B26F7E76F}"/>
+                <a16:creationId xmlns="" xmlns:a16="http://schemas.microsoft.com/office/drawing/2014/main" id="{FA81E0D3-9A1D-4C62-8928-407B26F7E76F}"/>
               </a:ext>
             </a:extLst>
           </p:cNvPr>
@@ -7901,7 +7917,7 @@
           <p:cNvPr id="3" name="Content Placeholder 2">
             <a:extLst>
               <a:ext uri="{FF2B5EF4-FFF2-40B4-BE49-F238E27FC236}">
-                <a16:creationId xmlns:a16="http://schemas.microsoft.com/office/drawing/2014/main" xmlns="" id="{4822CB6E-9A78-4044-A720-25145CCB9E98}"/>
+                <a16:creationId xmlns="" xmlns:a16="http://schemas.microsoft.com/office/drawing/2014/main" id="{4822CB6E-9A78-4044-A720-25145CCB9E98}"/>
               </a:ext>
             </a:extLst>
           </p:cNvPr>
@@ -8012,7 +8028,7 @@
           <p:cNvPr id="2" name="Title 1">
             <a:extLst>
               <a:ext uri="{FF2B5EF4-FFF2-40B4-BE49-F238E27FC236}">
-                <a16:creationId xmlns:a16="http://schemas.microsoft.com/office/drawing/2014/main" xmlns="" id="{C8A43429-ED92-4281-AA51-51F2DD7C8932}"/>
+                <a16:creationId xmlns="" xmlns:a16="http://schemas.microsoft.com/office/drawing/2014/main" id="{C8A43429-ED92-4281-AA51-51F2DD7C8932}"/>
               </a:ext>
             </a:extLst>
           </p:cNvPr>
@@ -8040,7 +8056,7 @@
           <p:cNvPr id="3" name="Content Placeholder 2">
             <a:extLst>
               <a:ext uri="{FF2B5EF4-FFF2-40B4-BE49-F238E27FC236}">
-                <a16:creationId xmlns:a16="http://schemas.microsoft.com/office/drawing/2014/main" xmlns="" id="{370DA339-823A-4DD5-A25B-A17459054ECC}"/>
+                <a16:creationId xmlns="" xmlns:a16="http://schemas.microsoft.com/office/drawing/2014/main" id="{370DA339-823A-4DD5-A25B-A17459054ECC}"/>
               </a:ext>
             </a:extLst>
           </p:cNvPr>
@@ -8302,7 +8318,7 @@
           <p:cNvPr id="2" name="Title 1">
             <a:extLst>
               <a:ext uri="{FF2B5EF4-FFF2-40B4-BE49-F238E27FC236}">
-                <a16:creationId xmlns:a16="http://schemas.microsoft.com/office/drawing/2014/main" xmlns="" id="{77CEF0D8-FB92-403A-9059-757AC0ECB37C}"/>
+                <a16:creationId xmlns="" xmlns:a16="http://schemas.microsoft.com/office/drawing/2014/main" id="{77CEF0D8-FB92-403A-9059-757AC0ECB37C}"/>
               </a:ext>
             </a:extLst>
           </p:cNvPr>
@@ -8336,7 +8352,7 @@
           <p:cNvPr id="5" name="Content Placeholder 4" descr="A screenshot of a cell phone&#10;&#10;Description automatically generated">
             <a:extLst>
               <a:ext uri="{FF2B5EF4-FFF2-40B4-BE49-F238E27FC236}">
-                <a16:creationId xmlns:a16="http://schemas.microsoft.com/office/drawing/2014/main" xmlns="" id="{249F704D-5A31-4DDE-8214-A5D700059205}"/>
+                <a16:creationId xmlns="" xmlns:a16="http://schemas.microsoft.com/office/drawing/2014/main" id="{249F704D-5A31-4DDE-8214-A5D700059205}"/>
               </a:ext>
             </a:extLst>
           </p:cNvPr>
@@ -8408,7 +8424,7 @@
           <p:cNvPr id="2" name="Title 1">
             <a:extLst>
               <a:ext uri="{FF2B5EF4-FFF2-40B4-BE49-F238E27FC236}">
-                <a16:creationId xmlns:a16="http://schemas.microsoft.com/office/drawing/2014/main" xmlns="" id="{9C39A80C-8464-41CA-BDCD-EB645EA136CE}"/>
+                <a16:creationId xmlns="" xmlns:a16="http://schemas.microsoft.com/office/drawing/2014/main" id="{9C39A80C-8464-41CA-BDCD-EB645EA136CE}"/>
               </a:ext>
             </a:extLst>
           </p:cNvPr>
@@ -8436,7 +8452,7 @@
           <p:cNvPr id="3" name="Content Placeholder 2">
             <a:extLst>
               <a:ext uri="{FF2B5EF4-FFF2-40B4-BE49-F238E27FC236}">
-                <a16:creationId xmlns:a16="http://schemas.microsoft.com/office/drawing/2014/main" xmlns="" id="{81311118-F188-4975-B56D-177599217FBB}"/>
+                <a16:creationId xmlns="" xmlns:a16="http://schemas.microsoft.com/office/drawing/2014/main" id="{81311118-F188-4975-B56D-177599217FBB}"/>
               </a:ext>
             </a:extLst>
           </p:cNvPr>
@@ -8840,7 +8856,7 @@
           <p:cNvPr id="2" name="Title 1">
             <a:extLst>
               <a:ext uri="{FF2B5EF4-FFF2-40B4-BE49-F238E27FC236}">
-                <a16:creationId xmlns:a16="http://schemas.microsoft.com/office/drawing/2014/main" xmlns="" id="{FF3DDD72-8659-4F45-90A8-045329DE22AF}"/>
+                <a16:creationId xmlns="" xmlns:a16="http://schemas.microsoft.com/office/drawing/2014/main" id="{FF3DDD72-8659-4F45-90A8-045329DE22AF}"/>
               </a:ext>
             </a:extLst>
           </p:cNvPr>
@@ -8876,7 +8892,7 @@
           <p:cNvPr id="4" name="Content Placeholder 3">
             <a:extLst>
               <a:ext uri="{FF2B5EF4-FFF2-40B4-BE49-F238E27FC236}">
-                <a16:creationId xmlns:a16="http://schemas.microsoft.com/office/drawing/2014/main" xmlns="" id="{AA4DC3EC-64BF-48EF-B0DC-D5D064DDC9BC}"/>
+                <a16:creationId xmlns="" xmlns:a16="http://schemas.microsoft.com/office/drawing/2014/main" id="{AA4DC3EC-64BF-48EF-B0DC-D5D064DDC9BC}"/>
               </a:ext>
             </a:extLst>
           </p:cNvPr>
@@ -8945,7 +8961,7 @@
           <p:cNvPr id="2" name="Title 1">
             <a:extLst>
               <a:ext uri="{FF2B5EF4-FFF2-40B4-BE49-F238E27FC236}">
-                <a16:creationId xmlns:a16="http://schemas.microsoft.com/office/drawing/2014/main" xmlns="" id="{317FF266-F962-49C5-B455-DF38D71B5314}"/>
+                <a16:creationId xmlns="" xmlns:a16="http://schemas.microsoft.com/office/drawing/2014/main" id="{317FF266-F962-49C5-B455-DF38D71B5314}"/>
               </a:ext>
             </a:extLst>
           </p:cNvPr>
@@ -8981,7 +8997,7 @@
           <p:cNvPr id="4" name="Content Placeholder 3">
             <a:extLst>
               <a:ext uri="{FF2B5EF4-FFF2-40B4-BE49-F238E27FC236}">
-                <a16:creationId xmlns:a16="http://schemas.microsoft.com/office/drawing/2014/main" xmlns="" id="{77CE872D-CE83-4AB2-BED2-D62923027ECD}"/>
+                <a16:creationId xmlns="" xmlns:a16="http://schemas.microsoft.com/office/drawing/2014/main" id="{77CE872D-CE83-4AB2-BED2-D62923027ECD}"/>
               </a:ext>
             </a:extLst>
           </p:cNvPr>
@@ -9013,7 +9029,7 @@
           <p:cNvPr id="7" name="Picture 6" descr="A screenshot of a cell phone&#10;&#10;Description automatically generated">
             <a:extLst>
               <a:ext uri="{FF2B5EF4-FFF2-40B4-BE49-F238E27FC236}">
-                <a16:creationId xmlns:a16="http://schemas.microsoft.com/office/drawing/2014/main" xmlns="" id="{7DFCE26F-A3C0-438D-AF16-407716C3707B}"/>
+                <a16:creationId xmlns="" xmlns:a16="http://schemas.microsoft.com/office/drawing/2014/main" id="{7DFCE26F-A3C0-438D-AF16-407716C3707B}"/>
               </a:ext>
             </a:extLst>
           </p:cNvPr>
@@ -9049,7 +9065,7 @@
           <p:cNvPr id="8" name="Picture 7">
             <a:extLst>
               <a:ext uri="{FF2B5EF4-FFF2-40B4-BE49-F238E27FC236}">
-                <a16:creationId xmlns:a16="http://schemas.microsoft.com/office/drawing/2014/main" xmlns="" id="{18E2C85D-1846-439E-9E8D-E56F03C98655}"/>
+                <a16:creationId xmlns="" xmlns:a16="http://schemas.microsoft.com/office/drawing/2014/main" id="{18E2C85D-1846-439E-9E8D-E56F03C98655}"/>
               </a:ext>
             </a:extLst>
           </p:cNvPr>
@@ -9116,7 +9132,7 @@
           <p:cNvPr id="2" name="Title 1">
             <a:extLst>
               <a:ext uri="{FF2B5EF4-FFF2-40B4-BE49-F238E27FC236}">
-                <a16:creationId xmlns:a16="http://schemas.microsoft.com/office/drawing/2014/main" xmlns="" id="{52F2E74F-4DE7-43AD-BF05-433F90BC9D54}"/>
+                <a16:creationId xmlns="" xmlns:a16="http://schemas.microsoft.com/office/drawing/2014/main" id="{52F2E74F-4DE7-43AD-BF05-433F90BC9D54}"/>
               </a:ext>
             </a:extLst>
           </p:cNvPr>
@@ -9149,7 +9165,7 @@
           <p:cNvPr id="3" name="Content Placeholder 2">
             <a:extLst>
               <a:ext uri="{FF2B5EF4-FFF2-40B4-BE49-F238E27FC236}">
-                <a16:creationId xmlns:a16="http://schemas.microsoft.com/office/drawing/2014/main" xmlns="" id="{6AD36AF7-303D-4591-9818-694101739E4A}"/>
+                <a16:creationId xmlns="" xmlns:a16="http://schemas.microsoft.com/office/drawing/2014/main" id="{6AD36AF7-303D-4591-9818-694101739E4A}"/>
               </a:ext>
             </a:extLst>
           </p:cNvPr>
@@ -9362,7 +9378,7 @@
           <p:cNvPr id="2" name="Title 1">
             <a:extLst>
               <a:ext uri="{FF2B5EF4-FFF2-40B4-BE49-F238E27FC236}">
-                <a16:creationId xmlns:a16="http://schemas.microsoft.com/office/drawing/2014/main" xmlns="" id="{52F2E74F-4DE7-43AD-BF05-433F90BC9D54}"/>
+                <a16:creationId xmlns="" xmlns:a16="http://schemas.microsoft.com/office/drawing/2014/main" id="{52F2E74F-4DE7-43AD-BF05-433F90BC9D54}"/>
               </a:ext>
             </a:extLst>
           </p:cNvPr>
@@ -9391,7 +9407,7 @@
           <p:cNvPr id="4" name="Picture 3" descr="A screenshot of a cell phone&#10;&#10;Description automatically generated">
             <a:extLst>
               <a:ext uri="{FF2B5EF4-FFF2-40B4-BE49-F238E27FC236}">
-                <a16:creationId xmlns:a16="http://schemas.microsoft.com/office/drawing/2014/main" xmlns="" id="{73AA0A4A-E605-41AD-B59D-0E802902C022}"/>
+                <a16:creationId xmlns="" xmlns:a16="http://schemas.microsoft.com/office/drawing/2014/main" id="{73AA0A4A-E605-41AD-B59D-0E802902C022}"/>
               </a:ext>
             </a:extLst>
           </p:cNvPr>
@@ -9427,7 +9443,7 @@
           <p:cNvPr id="8" name="Content Placeholder 2">
             <a:extLst>
               <a:ext uri="{FF2B5EF4-FFF2-40B4-BE49-F238E27FC236}">
-                <a16:creationId xmlns:a16="http://schemas.microsoft.com/office/drawing/2014/main" xmlns="" id="{9A507AAD-BD1B-491A-8FBB-35F1B477C9DC}"/>
+                <a16:creationId xmlns="" xmlns:a16="http://schemas.microsoft.com/office/drawing/2014/main" id="{9A507AAD-BD1B-491A-8FBB-35F1B477C9DC}"/>
               </a:ext>
             </a:extLst>
           </p:cNvPr>
@@ -9538,7 +9554,7 @@
           <p:cNvPr id="2" name="Title 1">
             <a:extLst>
               <a:ext uri="{FF2B5EF4-FFF2-40B4-BE49-F238E27FC236}">
-                <a16:creationId xmlns:a16="http://schemas.microsoft.com/office/drawing/2014/main" xmlns="" id="{46CD16EB-71F8-43D0-8DE6-1DA611C24B67}"/>
+                <a16:creationId xmlns="" xmlns:a16="http://schemas.microsoft.com/office/drawing/2014/main" id="{46CD16EB-71F8-43D0-8DE6-1DA611C24B67}"/>
               </a:ext>
             </a:extLst>
           </p:cNvPr>
@@ -9566,7 +9582,7 @@
           <p:cNvPr id="3" name="Content Placeholder 2">
             <a:extLst>
               <a:ext uri="{FF2B5EF4-FFF2-40B4-BE49-F238E27FC236}">
-                <a16:creationId xmlns:a16="http://schemas.microsoft.com/office/drawing/2014/main" xmlns="" id="{015ED0D7-E67B-4520-B26D-E3D7BE98FED8}"/>
+                <a16:creationId xmlns="" xmlns:a16="http://schemas.microsoft.com/office/drawing/2014/main" id="{015ED0D7-E67B-4520-B26D-E3D7BE98FED8}"/>
               </a:ext>
             </a:extLst>
           </p:cNvPr>
@@ -9701,7 +9717,7 @@
           <p:cNvPr id="2" name="Title 1">
             <a:extLst>
               <a:ext uri="{FF2B5EF4-FFF2-40B4-BE49-F238E27FC236}">
-                <a16:creationId xmlns:a16="http://schemas.microsoft.com/office/drawing/2014/main" xmlns="" id="{52F2E74F-4DE7-43AD-BF05-433F90BC9D54}"/>
+                <a16:creationId xmlns="" xmlns:a16="http://schemas.microsoft.com/office/drawing/2014/main" id="{52F2E74F-4DE7-43AD-BF05-433F90BC9D54}"/>
               </a:ext>
             </a:extLst>
           </p:cNvPr>
@@ -9734,7 +9750,7 @@
           <p:cNvPr id="3" name="Content Placeholder 2">
             <a:extLst>
               <a:ext uri="{FF2B5EF4-FFF2-40B4-BE49-F238E27FC236}">
-                <a16:creationId xmlns:a16="http://schemas.microsoft.com/office/drawing/2014/main" xmlns="" id="{6AD36AF7-303D-4591-9818-694101739E4A}"/>
+                <a16:creationId xmlns="" xmlns:a16="http://schemas.microsoft.com/office/drawing/2014/main" id="{6AD36AF7-303D-4591-9818-694101739E4A}"/>
               </a:ext>
             </a:extLst>
           </p:cNvPr>
@@ -9911,7 +9927,7 @@
           <p:cNvPr id="2" name="Title 1">
             <a:extLst>
               <a:ext uri="{FF2B5EF4-FFF2-40B4-BE49-F238E27FC236}">
-                <a16:creationId xmlns:a16="http://schemas.microsoft.com/office/drawing/2014/main" xmlns="" id="{52F2E74F-4DE7-43AD-BF05-433F90BC9D54}"/>
+                <a16:creationId xmlns="" xmlns:a16="http://schemas.microsoft.com/office/drawing/2014/main" id="{52F2E74F-4DE7-43AD-BF05-433F90BC9D54}"/>
               </a:ext>
             </a:extLst>
           </p:cNvPr>
@@ -9944,7 +9960,7 @@
           <p:cNvPr id="3" name="Content Placeholder 2">
             <a:extLst>
               <a:ext uri="{FF2B5EF4-FFF2-40B4-BE49-F238E27FC236}">
-                <a16:creationId xmlns:a16="http://schemas.microsoft.com/office/drawing/2014/main" xmlns="" id="{6AD36AF7-303D-4591-9818-694101739E4A}"/>
+                <a16:creationId xmlns="" xmlns:a16="http://schemas.microsoft.com/office/drawing/2014/main" id="{6AD36AF7-303D-4591-9818-694101739E4A}"/>
               </a:ext>
             </a:extLst>
           </p:cNvPr>
@@ -10237,7 +10253,7 @@
           <p:cNvPr id="2" name="Title 1">
             <a:extLst>
               <a:ext uri="{FF2B5EF4-FFF2-40B4-BE49-F238E27FC236}">
-                <a16:creationId xmlns:a16="http://schemas.microsoft.com/office/drawing/2014/main" xmlns="" id="{52F2E74F-4DE7-43AD-BF05-433F90BC9D54}"/>
+                <a16:creationId xmlns="" xmlns:a16="http://schemas.microsoft.com/office/drawing/2014/main" id="{52F2E74F-4DE7-43AD-BF05-433F90BC9D54}"/>
               </a:ext>
             </a:extLst>
           </p:cNvPr>
@@ -10270,7 +10286,7 @@
           <p:cNvPr id="3" name="Content Placeholder 2">
             <a:extLst>
               <a:ext uri="{FF2B5EF4-FFF2-40B4-BE49-F238E27FC236}">
-                <a16:creationId xmlns:a16="http://schemas.microsoft.com/office/drawing/2014/main" xmlns="" id="{6AD36AF7-303D-4591-9818-694101739E4A}"/>
+                <a16:creationId xmlns="" xmlns:a16="http://schemas.microsoft.com/office/drawing/2014/main" id="{6AD36AF7-303D-4591-9818-694101739E4A}"/>
               </a:ext>
             </a:extLst>
           </p:cNvPr>
@@ -10447,7 +10463,7 @@
           <p:cNvPr id="2" name="Title 1">
             <a:extLst>
               <a:ext uri="{FF2B5EF4-FFF2-40B4-BE49-F238E27FC236}">
-                <a16:creationId xmlns:a16="http://schemas.microsoft.com/office/drawing/2014/main" xmlns="" id="{52F2E74F-4DE7-43AD-BF05-433F90BC9D54}"/>
+                <a16:creationId xmlns="" xmlns:a16="http://schemas.microsoft.com/office/drawing/2014/main" id="{52F2E74F-4DE7-43AD-BF05-433F90BC9D54}"/>
               </a:ext>
             </a:extLst>
           </p:cNvPr>
@@ -10480,7 +10496,7 @@
           <p:cNvPr id="3" name="Content Placeholder 2">
             <a:extLst>
               <a:ext uri="{FF2B5EF4-FFF2-40B4-BE49-F238E27FC236}">
-                <a16:creationId xmlns:a16="http://schemas.microsoft.com/office/drawing/2014/main" xmlns="" id="{6AD36AF7-303D-4591-9818-694101739E4A}"/>
+                <a16:creationId xmlns="" xmlns:a16="http://schemas.microsoft.com/office/drawing/2014/main" id="{6AD36AF7-303D-4591-9818-694101739E4A}"/>
               </a:ext>
             </a:extLst>
           </p:cNvPr>
@@ -10656,7 +10672,7 @@
           <p:cNvPr id="2" name="Title 1">
             <a:extLst>
               <a:ext uri="{FF2B5EF4-FFF2-40B4-BE49-F238E27FC236}">
-                <a16:creationId xmlns:a16="http://schemas.microsoft.com/office/drawing/2014/main" xmlns="" id="{DBB7EADA-4D05-4172-B2EC-8CDB1FD390A2}"/>
+                <a16:creationId xmlns="" xmlns:a16="http://schemas.microsoft.com/office/drawing/2014/main" id="{DBB7EADA-4D05-4172-B2EC-8CDB1FD390A2}"/>
               </a:ext>
             </a:extLst>
           </p:cNvPr>
@@ -10684,7 +10700,7 @@
           <p:cNvPr id="3" name="Content Placeholder 2">
             <a:extLst>
               <a:ext uri="{FF2B5EF4-FFF2-40B4-BE49-F238E27FC236}">
-                <a16:creationId xmlns:a16="http://schemas.microsoft.com/office/drawing/2014/main" xmlns="" id="{03B26E14-AF6C-4027-B54D-A4C6EA2F78C8}"/>
+                <a16:creationId xmlns="" xmlns:a16="http://schemas.microsoft.com/office/drawing/2014/main" id="{03B26E14-AF6C-4027-B54D-A4C6EA2F78C8}"/>
               </a:ext>
             </a:extLst>
           </p:cNvPr>
@@ -10714,7 +10730,7 @@
           <p:cNvPr id="4" name="Content Placeholder 2">
             <a:extLst>
               <a:ext uri="{FF2B5EF4-FFF2-40B4-BE49-F238E27FC236}">
-                <a16:creationId xmlns:a16="http://schemas.microsoft.com/office/drawing/2014/main" xmlns="" id="{A50669FB-F9E4-4CC2-822B-114B8BD1DE4E}"/>
+                <a16:creationId xmlns="" xmlns:a16="http://schemas.microsoft.com/office/drawing/2014/main" id="{A50669FB-F9E4-4CC2-822B-114B8BD1DE4E}"/>
               </a:ext>
             </a:extLst>
           </p:cNvPr>
@@ -10953,7 +10969,7 @@
           <p:cNvPr id="5" name="Content Placeholder 3">
             <a:extLst>
               <a:ext uri="{FF2B5EF4-FFF2-40B4-BE49-F238E27FC236}">
-                <a16:creationId xmlns:a16="http://schemas.microsoft.com/office/drawing/2014/main" xmlns="" id="{3896ABFF-3E87-479B-B610-EEB3915EA162}"/>
+                <a16:creationId xmlns="" xmlns:a16="http://schemas.microsoft.com/office/drawing/2014/main" id="{3896ABFF-3E87-479B-B610-EEB3915EA162}"/>
               </a:ext>
             </a:extLst>
           </p:cNvPr>
@@ -11215,7 +11231,7 @@
           <p:cNvPr id="6" name="Rectangle 5">
             <a:extLst>
               <a:ext uri="{FF2B5EF4-FFF2-40B4-BE49-F238E27FC236}">
-                <a16:creationId xmlns:a16="http://schemas.microsoft.com/office/drawing/2014/main" xmlns="" id="{5E68CB36-D3A3-4B60-8FF0-8953A02A8F67}"/>
+                <a16:creationId xmlns="" xmlns:a16="http://schemas.microsoft.com/office/drawing/2014/main" id="{5E68CB36-D3A3-4B60-8FF0-8953A02A8F67}"/>
               </a:ext>
             </a:extLst>
           </p:cNvPr>
@@ -11321,7 +11337,7 @@
           <p:cNvPr id="7" name="Rectangle 6">
             <a:extLst>
               <a:ext uri="{FF2B5EF4-FFF2-40B4-BE49-F238E27FC236}">
-                <a16:creationId xmlns:a16="http://schemas.microsoft.com/office/drawing/2014/main" xmlns="" id="{095B4BB6-52E4-4DAC-A2EC-2AEE558821E1}"/>
+                <a16:creationId xmlns="" xmlns:a16="http://schemas.microsoft.com/office/drawing/2014/main" id="{095B4BB6-52E4-4DAC-A2EC-2AEE558821E1}"/>
               </a:ext>
             </a:extLst>
           </p:cNvPr>
@@ -11453,7 +11469,7 @@
           <p:cNvPr id="10" name="TextBox 9">
             <a:extLst>
               <a:ext uri="{FF2B5EF4-FFF2-40B4-BE49-F238E27FC236}">
-                <a16:creationId xmlns:a16="http://schemas.microsoft.com/office/drawing/2014/main" xmlns="" id="{C747FAE8-C1BC-4599-B084-4D8B9FD0BB22}"/>
+                <a16:creationId xmlns="" xmlns:a16="http://schemas.microsoft.com/office/drawing/2014/main" id="{C747FAE8-C1BC-4599-B084-4D8B9FD0BB22}"/>
               </a:ext>
             </a:extLst>
           </p:cNvPr>
@@ -11522,7 +11538,7 @@
           <p:cNvPr id="2" name="Title 1">
             <a:extLst>
               <a:ext uri="{FF2B5EF4-FFF2-40B4-BE49-F238E27FC236}">
-                <a16:creationId xmlns:a16="http://schemas.microsoft.com/office/drawing/2014/main" xmlns="" id="{FD668296-38FB-4DA0-80E7-D687C231E5F2}"/>
+                <a16:creationId xmlns="" xmlns:a16="http://schemas.microsoft.com/office/drawing/2014/main" id="{FD668296-38FB-4DA0-80E7-D687C231E5F2}"/>
               </a:ext>
             </a:extLst>
           </p:cNvPr>
@@ -11550,7 +11566,7 @@
           <p:cNvPr id="3" name="Content Placeholder 2">
             <a:extLst>
               <a:ext uri="{FF2B5EF4-FFF2-40B4-BE49-F238E27FC236}">
-                <a16:creationId xmlns:a16="http://schemas.microsoft.com/office/drawing/2014/main" xmlns="" id="{46326C98-889C-4B30-AEE7-E732A9CAEE31}"/>
+                <a16:creationId xmlns="" xmlns:a16="http://schemas.microsoft.com/office/drawing/2014/main" id="{46326C98-889C-4B30-AEE7-E732A9CAEE31}"/>
               </a:ext>
             </a:extLst>
           </p:cNvPr>
@@ -11605,12 +11621,12 @@
           </a:p>
           <a:p>
             <a:r>
-              <a:rPr lang="en-US">
+              <a:rPr lang="en-US" dirty="0">
                 <a:hlinkClick r:id="rId4"/>
               </a:rPr>
               <a:t>https://docs.aws.amazon.com/quickstart/latest/mongodb/overview.html</a:t>
             </a:r>
-            <a:endParaRPr lang="en-US"/>
+            <a:endParaRPr lang="en-US" dirty="0"/>
           </a:p>
           <a:p>
             <a:endParaRPr lang="en-US" dirty="0"/>
@@ -11657,12 +11673,1270 @@
           <a:chExt cx="0" cy="0"/>
         </a:xfrm>
       </p:grpSpPr>
+      <p:sp>
+        <p:nvSpPr>
+          <p:cNvPr id="4" name="Title 3"/>
+          <p:cNvSpPr>
+            <a:spLocks noGrp="1"/>
+          </p:cNvSpPr>
+          <p:nvPr>
+            <p:ph type="title"/>
+          </p:nvPr>
+        </p:nvSpPr>
+        <p:spPr/>
+        <p:txBody>
+          <a:bodyPr/>
+          <a:lstStyle/>
+          <a:p>
+            <a:r>
+              <a:rPr lang="en-US" dirty="0" smtClean="0"/>
+              <a:t>Connect </a:t>
+            </a:r>
+            <a:r>
+              <a:rPr lang="en-US" dirty="0" err="1" smtClean="0"/>
+              <a:t>dari</a:t>
+            </a:r>
+            <a:r>
+              <a:rPr lang="en-US" dirty="0" smtClean="0"/>
+              <a:t> PHP</a:t>
+            </a:r>
+            <a:endParaRPr lang="en-US" dirty="0"/>
+          </a:p>
+        </p:txBody>
+      </p:sp>
+      <p:sp>
+        <p:nvSpPr>
+          <p:cNvPr id="5" name="Text Placeholder 4"/>
+          <p:cNvSpPr>
+            <a:spLocks noGrp="1"/>
+          </p:cNvSpPr>
+          <p:nvPr>
+            <p:ph type="body" idx="1"/>
+          </p:nvPr>
+        </p:nvSpPr>
+        <p:spPr/>
+        <p:txBody>
+          <a:bodyPr/>
+          <a:lstStyle/>
+          <a:p>
+            <a:endParaRPr lang="en-US"/>
+          </a:p>
+        </p:txBody>
+      </p:sp>
+    </p:spTree>
+    <p:extLst>
+      <p:ext uri="{BB962C8B-B14F-4D97-AF65-F5344CB8AC3E}">
+        <p14:creationId xmlns:p14="http://schemas.microsoft.com/office/powerpoint/2010/main" val="1570602714"/>
+      </p:ext>
+    </p:extLst>
+  </p:cSld>
+  <p:clrMapOvr>
+    <a:masterClrMapping/>
+  </p:clrMapOvr>
+  <p:timing>
+    <p:tnLst>
+      <p:par>
+        <p:cTn id="1" dur="indefinite" restart="never" nodeType="tmRoot"/>
+      </p:par>
+    </p:tnLst>
+  </p:timing>
+</p:sld>
+</file>
+
+<file path=ppt/slides/slide42.xml><?xml version="1.0" encoding="utf-8"?>
+<p:sld xmlns:a="http://schemas.openxmlformats.org/drawingml/2006/main" xmlns:r="http://schemas.openxmlformats.org/officeDocument/2006/relationships" xmlns:p="http://schemas.openxmlformats.org/presentationml/2006/main">
+  <p:cSld>
+    <p:spTree>
+      <p:nvGrpSpPr>
+        <p:cNvPr id="1" name=""/>
+        <p:cNvGrpSpPr/>
+        <p:nvPr/>
+      </p:nvGrpSpPr>
+      <p:grpSpPr>
+        <a:xfrm>
+          <a:off x="0" y="0"/>
+          <a:ext cx="0" cy="0"/>
+          <a:chOff x="0" y="0"/>
+          <a:chExt cx="0" cy="0"/>
+        </a:xfrm>
+      </p:grpSpPr>
+      <p:sp>
+        <p:nvSpPr>
+          <p:cNvPr id="2" name="Title 1"/>
+          <p:cNvSpPr>
+            <a:spLocks noGrp="1"/>
+          </p:cNvSpPr>
+          <p:nvPr>
+            <p:ph type="title"/>
+          </p:nvPr>
+        </p:nvSpPr>
+        <p:spPr/>
+        <p:txBody>
+          <a:bodyPr/>
+          <a:lstStyle/>
+          <a:p>
+            <a:r>
+              <a:rPr lang="en-US" dirty="0" err="1" smtClean="0"/>
+              <a:t>Persiapan</a:t>
+            </a:r>
+            <a:endParaRPr lang="en-US" dirty="0"/>
+          </a:p>
+        </p:txBody>
+      </p:sp>
+      <p:sp>
+        <p:nvSpPr>
+          <p:cNvPr id="3" name="Content Placeholder 2"/>
+          <p:cNvSpPr>
+            <a:spLocks noGrp="1"/>
+          </p:cNvSpPr>
+          <p:nvPr>
+            <p:ph idx="1"/>
+          </p:nvPr>
+        </p:nvSpPr>
+        <p:spPr/>
+        <p:txBody>
+          <a:bodyPr/>
+          <a:lstStyle/>
+          <a:p>
+            <a:r>
+              <a:rPr lang="en-US" dirty="0" smtClean="0"/>
+              <a:t>Install MongoDB driver</a:t>
+            </a:r>
+          </a:p>
+          <a:p>
+            <a:r>
+              <a:rPr lang="en-US" dirty="0" smtClean="0"/>
+              <a:t>Install composer for PHP</a:t>
+            </a:r>
+            <a:endParaRPr lang="en-US" dirty="0"/>
+          </a:p>
+        </p:txBody>
+      </p:sp>
+    </p:spTree>
+    <p:extLst>
+      <p:ext uri="{BB962C8B-B14F-4D97-AF65-F5344CB8AC3E}">
+        <p14:creationId xmlns:p14="http://schemas.microsoft.com/office/powerpoint/2010/main" val="2775573272"/>
+      </p:ext>
+    </p:extLst>
+  </p:cSld>
+  <p:clrMapOvr>
+    <a:masterClrMapping/>
+  </p:clrMapOvr>
+  <p:timing>
+    <p:tnLst>
+      <p:par>
+        <p:cTn id="1" dur="indefinite" restart="never" nodeType="tmRoot"/>
+      </p:par>
+    </p:tnLst>
+  </p:timing>
+</p:sld>
+</file>
+
+<file path=ppt/slides/slide43.xml><?xml version="1.0" encoding="utf-8"?>
+<p:sld xmlns:a="http://schemas.openxmlformats.org/drawingml/2006/main" xmlns:r="http://schemas.openxmlformats.org/officeDocument/2006/relationships" xmlns:p="http://schemas.openxmlformats.org/presentationml/2006/main">
+  <p:cSld>
+    <p:spTree>
+      <p:nvGrpSpPr>
+        <p:cNvPr id="1" name=""/>
+        <p:cNvGrpSpPr/>
+        <p:nvPr/>
+      </p:nvGrpSpPr>
+      <p:grpSpPr>
+        <a:xfrm>
+          <a:off x="0" y="0"/>
+          <a:ext cx="0" cy="0"/>
+          <a:chOff x="0" y="0"/>
+          <a:chExt cx="0" cy="0"/>
+        </a:xfrm>
+      </p:grpSpPr>
+      <p:sp>
+        <p:nvSpPr>
+          <p:cNvPr id="2" name="Title 1"/>
+          <p:cNvSpPr>
+            <a:spLocks noGrp="1"/>
+          </p:cNvSpPr>
+          <p:nvPr>
+            <p:ph type="title"/>
+          </p:nvPr>
+        </p:nvSpPr>
+        <p:spPr/>
+        <p:txBody>
+          <a:bodyPr/>
+          <a:lstStyle/>
+          <a:p>
+            <a:r>
+              <a:rPr lang="en-US" dirty="0" smtClean="0"/>
+              <a:t>Install MongoDB Driver</a:t>
+            </a:r>
+            <a:endParaRPr lang="en-US" dirty="0"/>
+          </a:p>
+        </p:txBody>
+      </p:sp>
+      <p:sp>
+        <p:nvSpPr>
+          <p:cNvPr id="3" name="Content Placeholder 2"/>
+          <p:cNvSpPr>
+            <a:spLocks noGrp="1"/>
+          </p:cNvSpPr>
+          <p:nvPr>
+            <p:ph idx="1"/>
+          </p:nvPr>
+        </p:nvSpPr>
+        <p:spPr/>
+        <p:txBody>
+          <a:bodyPr/>
+          <a:lstStyle/>
+          <a:p>
+            <a:r>
+              <a:rPr lang="en-US" dirty="0" smtClean="0"/>
+              <a:t>Create </a:t>
+            </a:r>
+            <a:r>
+              <a:rPr lang="en-US" dirty="0" err="1" smtClean="0"/>
+              <a:t>info.php</a:t>
+            </a:r>
+            <a:endParaRPr lang="en-US" dirty="0" smtClean="0"/>
+          </a:p>
+          <a:p>
+            <a:pPr marL="457200" lvl="1" indent="0">
+              <a:buNone/>
+            </a:pPr>
+            <a:r>
+              <a:rPr lang="en-US" b="1" dirty="0" smtClean="0">
+                <a:solidFill>
+                  <a:srgbClr val="FF0000"/>
+                </a:solidFill>
+              </a:rPr>
+              <a:t>&lt;?</a:t>
+            </a:r>
+            <a:r>
+              <a:rPr lang="en-US" b="1" dirty="0" err="1" smtClean="0">
+                <a:solidFill>
+                  <a:srgbClr val="FF0000"/>
+                </a:solidFill>
+              </a:rPr>
+              <a:t>php</a:t>
+            </a:r>
+            <a:endParaRPr lang="en-US" b="1" dirty="0">
+              <a:solidFill>
+                <a:srgbClr val="FF0000"/>
+              </a:solidFill>
+            </a:endParaRPr>
+          </a:p>
+          <a:p>
+            <a:pPr marL="457200" lvl="1" indent="0">
+              <a:buNone/>
+            </a:pPr>
+            <a:r>
+              <a:rPr lang="en-US" b="1" dirty="0" smtClean="0">
+                <a:solidFill>
+                  <a:srgbClr val="FF0000"/>
+                </a:solidFill>
+              </a:rPr>
+              <a:t>	</a:t>
+            </a:r>
+            <a:r>
+              <a:rPr lang="en-US" b="1" dirty="0" err="1" smtClean="0">
+                <a:solidFill>
+                  <a:srgbClr val="FF0000"/>
+                </a:solidFill>
+              </a:rPr>
+              <a:t>phpinfo</a:t>
+            </a:r>
+            <a:r>
+              <a:rPr lang="en-US" b="1" dirty="0" smtClean="0">
+                <a:solidFill>
+                  <a:srgbClr val="FF0000"/>
+                </a:solidFill>
+              </a:rPr>
+              <a:t>();</a:t>
+            </a:r>
+          </a:p>
+          <a:p>
+            <a:pPr marL="457200" lvl="1" indent="0">
+              <a:buNone/>
+            </a:pPr>
+            <a:r>
+              <a:rPr lang="en-US" b="1" dirty="0" smtClean="0">
+                <a:solidFill>
+                  <a:srgbClr val="FF0000"/>
+                </a:solidFill>
+              </a:rPr>
+              <a:t>&gt;?</a:t>
+            </a:r>
+            <a:endParaRPr lang="en-US" b="1" dirty="0">
+              <a:solidFill>
+                <a:srgbClr val="FF0000"/>
+              </a:solidFill>
+            </a:endParaRPr>
+          </a:p>
+          <a:p>
+            <a:r>
+              <a:rPr lang="en-US" dirty="0" err="1"/>
+              <a:t>Cek</a:t>
+            </a:r>
+            <a:r>
+              <a:rPr lang="en-US" dirty="0"/>
+              <a:t> PHP</a:t>
+            </a:r>
+          </a:p>
+          <a:p>
+            <a:pPr lvl="1"/>
+            <a:r>
+              <a:rPr lang="en-US" dirty="0" err="1" smtClean="0"/>
+              <a:t>Versi</a:t>
+            </a:r>
+            <a:r>
+              <a:rPr lang="en-US" dirty="0" smtClean="0"/>
+              <a:t>: 7.2.4</a:t>
+            </a:r>
+          </a:p>
+          <a:p>
+            <a:pPr lvl="1"/>
+            <a:r>
+              <a:rPr lang="en-US" dirty="0" smtClean="0"/>
+              <a:t>Architecture: x86</a:t>
+            </a:r>
+            <a:endParaRPr lang="en-US" dirty="0"/>
+          </a:p>
+          <a:p>
+            <a:pPr lvl="1"/>
+            <a:r>
+              <a:rPr lang="en-US" dirty="0"/>
+              <a:t>Thread </a:t>
+            </a:r>
+            <a:r>
+              <a:rPr lang="en-US" dirty="0" smtClean="0"/>
+              <a:t>Safety: enabled</a:t>
+            </a:r>
+            <a:endParaRPr lang="en-US" dirty="0"/>
+          </a:p>
+        </p:txBody>
+      </p:sp>
+    </p:spTree>
+    <p:extLst>
+      <p:ext uri="{BB962C8B-B14F-4D97-AF65-F5344CB8AC3E}">
+        <p14:creationId xmlns:p14="http://schemas.microsoft.com/office/powerpoint/2010/main" val="518318"/>
+      </p:ext>
+    </p:extLst>
+  </p:cSld>
+  <p:clrMapOvr>
+    <a:masterClrMapping/>
+  </p:clrMapOvr>
+  <p:timing>
+    <p:tnLst>
+      <p:par>
+        <p:cTn id="1" dur="indefinite" restart="never" nodeType="tmRoot"/>
+      </p:par>
+    </p:tnLst>
+  </p:timing>
+</p:sld>
+</file>
+
+<file path=ppt/slides/slide44.xml><?xml version="1.0" encoding="utf-8"?>
+<p:sld xmlns:a="http://schemas.openxmlformats.org/drawingml/2006/main" xmlns:r="http://schemas.openxmlformats.org/officeDocument/2006/relationships" xmlns:p="http://schemas.openxmlformats.org/presentationml/2006/main">
+  <p:cSld>
+    <p:spTree>
+      <p:nvGrpSpPr>
+        <p:cNvPr id="1" name=""/>
+        <p:cNvGrpSpPr/>
+        <p:nvPr/>
+      </p:nvGrpSpPr>
+      <p:grpSpPr>
+        <a:xfrm>
+          <a:off x="0" y="0"/>
+          <a:ext cx="0" cy="0"/>
+          <a:chOff x="0" y="0"/>
+          <a:chExt cx="0" cy="0"/>
+        </a:xfrm>
+      </p:grpSpPr>
+      <p:sp>
+        <p:nvSpPr>
+          <p:cNvPr id="2" name="Title 1"/>
+          <p:cNvSpPr>
+            <a:spLocks noGrp="1"/>
+          </p:cNvSpPr>
+          <p:nvPr>
+            <p:ph type="title"/>
+          </p:nvPr>
+        </p:nvSpPr>
+        <p:spPr/>
+        <p:txBody>
+          <a:bodyPr/>
+          <a:lstStyle/>
+          <a:p>
+            <a:r>
+              <a:rPr lang="en-US" dirty="0" smtClean="0"/>
+              <a:t>Install MongoDB Driver</a:t>
+            </a:r>
+            <a:endParaRPr lang="en-US" dirty="0"/>
+          </a:p>
+        </p:txBody>
+      </p:sp>
+      <p:sp>
+        <p:nvSpPr>
+          <p:cNvPr id="3" name="Content Placeholder 2"/>
+          <p:cNvSpPr>
+            <a:spLocks noGrp="1"/>
+          </p:cNvSpPr>
+          <p:nvPr>
+            <p:ph idx="1"/>
+          </p:nvPr>
+        </p:nvSpPr>
+        <p:spPr/>
+        <p:txBody>
+          <a:bodyPr/>
+          <a:lstStyle/>
+          <a:p>
+            <a:r>
+              <a:rPr lang="en-US" dirty="0" smtClean="0"/>
+              <a:t>Download driver </a:t>
+            </a:r>
+            <a:r>
+              <a:rPr lang="en-US" dirty="0" err="1" smtClean="0"/>
+              <a:t>sesuai</a:t>
+            </a:r>
+            <a:r>
+              <a:rPr lang="en-US" dirty="0" smtClean="0"/>
+              <a:t> </a:t>
+            </a:r>
+            <a:r>
+              <a:rPr lang="en-US" dirty="0" err="1" smtClean="0"/>
+              <a:t>dengan</a:t>
+            </a:r>
+            <a:r>
+              <a:rPr lang="en-US" dirty="0" smtClean="0"/>
+              <a:t> </a:t>
+            </a:r>
+            <a:r>
+              <a:rPr lang="en-US" dirty="0" err="1" smtClean="0"/>
+              <a:t>versi</a:t>
+            </a:r>
+            <a:r>
+              <a:rPr lang="en-US" dirty="0"/>
+              <a:t> PHP (</a:t>
+            </a:r>
+            <a:r>
+              <a:rPr lang="en-US" dirty="0">
+                <a:hlinkClick r:id="rId2"/>
+              </a:rPr>
+              <a:t>https://pecl.php.net/package/mongodb</a:t>
+            </a:r>
+            <a:r>
+              <a:rPr lang="en-US" dirty="0" smtClean="0"/>
+              <a:t>) </a:t>
+            </a:r>
+          </a:p>
+        </p:txBody>
+      </p:sp>
+      <p:pic>
+        <p:nvPicPr>
+          <p:cNvPr id="4" name="Picture 3"/>
+          <p:cNvPicPr>
+            <a:picLocks noChangeAspect="1"/>
+          </p:cNvPicPr>
+          <p:nvPr/>
+        </p:nvPicPr>
+        <p:blipFill>
+          <a:blip r:embed="rId3"/>
+          <a:stretch>
+            <a:fillRect/>
+          </a:stretch>
+        </p:blipFill>
+        <p:spPr>
+          <a:xfrm>
+            <a:off x="1416050" y="2726679"/>
+            <a:ext cx="5822786" cy="1832576"/>
+          </a:xfrm>
+          <a:prstGeom prst="rect">
+            <a:avLst/>
+          </a:prstGeom>
+        </p:spPr>
+      </p:pic>
+      <p:pic>
+        <p:nvPicPr>
+          <p:cNvPr id="5" name="Picture 4"/>
+          <p:cNvPicPr>
+            <a:picLocks noChangeAspect="1"/>
+          </p:cNvPicPr>
+          <p:nvPr/>
+        </p:nvPicPr>
+        <p:blipFill>
+          <a:blip r:embed="rId4"/>
+          <a:stretch>
+            <a:fillRect/>
+          </a:stretch>
+        </p:blipFill>
+        <p:spPr>
+          <a:xfrm>
+            <a:off x="2378411" y="4643981"/>
+            <a:ext cx="4225589" cy="1561224"/>
+          </a:xfrm>
+          <a:prstGeom prst="rect">
+            <a:avLst/>
+          </a:prstGeom>
+        </p:spPr>
+      </p:pic>
+    </p:spTree>
+    <p:extLst>
+      <p:ext uri="{BB962C8B-B14F-4D97-AF65-F5344CB8AC3E}">
+        <p14:creationId xmlns:p14="http://schemas.microsoft.com/office/powerpoint/2010/main" val="2781068355"/>
+      </p:ext>
+    </p:extLst>
+  </p:cSld>
+  <p:clrMapOvr>
+    <a:masterClrMapping/>
+  </p:clrMapOvr>
+  <p:timing>
+    <p:tnLst>
+      <p:par>
+        <p:cTn id="1" dur="indefinite" restart="never" nodeType="tmRoot"/>
+      </p:par>
+    </p:tnLst>
+  </p:timing>
+</p:sld>
+</file>
+
+<file path=ppt/slides/slide45.xml><?xml version="1.0" encoding="utf-8"?>
+<p:sld xmlns:a="http://schemas.openxmlformats.org/drawingml/2006/main" xmlns:r="http://schemas.openxmlformats.org/officeDocument/2006/relationships" xmlns:p="http://schemas.openxmlformats.org/presentationml/2006/main">
+  <p:cSld>
+    <p:spTree>
+      <p:nvGrpSpPr>
+        <p:cNvPr id="1" name=""/>
+        <p:cNvGrpSpPr/>
+        <p:nvPr/>
+      </p:nvGrpSpPr>
+      <p:grpSpPr>
+        <a:xfrm>
+          <a:off x="0" y="0"/>
+          <a:ext cx="0" cy="0"/>
+          <a:chOff x="0" y="0"/>
+          <a:chExt cx="0" cy="0"/>
+        </a:xfrm>
+      </p:grpSpPr>
+      <p:sp>
+        <p:nvSpPr>
+          <p:cNvPr id="2" name="Title 1"/>
+          <p:cNvSpPr>
+            <a:spLocks noGrp="1"/>
+          </p:cNvSpPr>
+          <p:nvPr>
+            <p:ph type="title"/>
+          </p:nvPr>
+        </p:nvSpPr>
+        <p:spPr/>
+        <p:txBody>
+          <a:bodyPr/>
+          <a:lstStyle/>
+          <a:p>
+            <a:r>
+              <a:rPr lang="en-US" dirty="0" smtClean="0"/>
+              <a:t>Install MongoDB Driver</a:t>
+            </a:r>
+            <a:endParaRPr lang="en-US" dirty="0"/>
+          </a:p>
+        </p:txBody>
+      </p:sp>
+      <p:sp>
+        <p:nvSpPr>
+          <p:cNvPr id="3" name="Content Placeholder 2"/>
+          <p:cNvSpPr>
+            <a:spLocks noGrp="1"/>
+          </p:cNvSpPr>
+          <p:nvPr>
+            <p:ph idx="1"/>
+          </p:nvPr>
+        </p:nvSpPr>
+        <p:spPr/>
+        <p:txBody>
+          <a:bodyPr/>
+          <a:lstStyle/>
+          <a:p>
+            <a:r>
+              <a:rPr lang="en-US" dirty="0"/>
+              <a:t>Extract </a:t>
+            </a:r>
+            <a:r>
+              <a:rPr lang="en-US" b="1" dirty="0">
+                <a:solidFill>
+                  <a:srgbClr val="FF0000"/>
+                </a:solidFill>
+              </a:rPr>
+              <a:t>php_mongodb.dll</a:t>
+            </a:r>
+            <a:r>
+              <a:rPr lang="en-US" dirty="0"/>
+              <a:t> </a:t>
+            </a:r>
+            <a:r>
+              <a:rPr lang="en-US" dirty="0" err="1" smtClean="0"/>
+              <a:t>dan</a:t>
+            </a:r>
+            <a:r>
+              <a:rPr lang="en-US" dirty="0" smtClean="0"/>
+              <a:t> copy </a:t>
+            </a:r>
+            <a:r>
+              <a:rPr lang="en-US" dirty="0" err="1" smtClean="0"/>
+              <a:t>ke</a:t>
+            </a:r>
+            <a:r>
+              <a:rPr lang="en-US" dirty="0" smtClean="0"/>
+              <a:t> </a:t>
+            </a:r>
+            <a:r>
+              <a:rPr lang="en-US" dirty="0"/>
+              <a:t>folder </a:t>
+            </a:r>
+            <a:r>
+              <a:rPr lang="en-US" b="1" dirty="0" err="1">
+                <a:solidFill>
+                  <a:srgbClr val="FF0000"/>
+                </a:solidFill>
+              </a:rPr>
+              <a:t>xampp</a:t>
+            </a:r>
+            <a:r>
+              <a:rPr lang="en-US" b="1" dirty="0">
+                <a:solidFill>
+                  <a:srgbClr val="FF0000"/>
+                </a:solidFill>
+              </a:rPr>
+              <a:t>\</a:t>
+            </a:r>
+            <a:r>
+              <a:rPr lang="en-US" b="1" dirty="0" err="1">
+                <a:solidFill>
+                  <a:srgbClr val="FF0000"/>
+                </a:solidFill>
+              </a:rPr>
+              <a:t>php</a:t>
+            </a:r>
+            <a:r>
+              <a:rPr lang="en-US" b="1" dirty="0">
+                <a:solidFill>
+                  <a:srgbClr val="FF0000"/>
+                </a:solidFill>
+              </a:rPr>
+              <a:t>\</a:t>
+            </a:r>
+            <a:r>
+              <a:rPr lang="en-US" b="1" dirty="0" err="1">
+                <a:solidFill>
+                  <a:srgbClr val="FF0000"/>
+                </a:solidFill>
+              </a:rPr>
+              <a:t>ext</a:t>
+            </a:r>
+            <a:endParaRPr lang="en-US" b="1" dirty="0">
+              <a:solidFill>
+                <a:srgbClr val="FF0000"/>
+              </a:solidFill>
+            </a:endParaRPr>
+          </a:p>
+          <a:p>
+            <a:r>
+              <a:rPr lang="en-US" dirty="0"/>
+              <a:t>Edit file </a:t>
+            </a:r>
+            <a:r>
+              <a:rPr lang="en-US" b="1" dirty="0">
+                <a:solidFill>
+                  <a:srgbClr val="FF0000"/>
+                </a:solidFill>
+              </a:rPr>
+              <a:t>php.ini </a:t>
+            </a:r>
+            <a:r>
+              <a:rPr lang="en-US" dirty="0"/>
+              <a:t>di folder </a:t>
+            </a:r>
+            <a:r>
+              <a:rPr lang="en-US" b="1" dirty="0" err="1">
+                <a:solidFill>
+                  <a:srgbClr val="FF0000"/>
+                </a:solidFill>
+              </a:rPr>
+              <a:t>xampp</a:t>
+            </a:r>
+            <a:r>
+              <a:rPr lang="en-US" b="1" dirty="0">
+                <a:solidFill>
+                  <a:srgbClr val="FF0000"/>
+                </a:solidFill>
+              </a:rPr>
+              <a:t>\</a:t>
+            </a:r>
+            <a:r>
+              <a:rPr lang="en-US" b="1" dirty="0" err="1">
+                <a:solidFill>
+                  <a:srgbClr val="FF0000"/>
+                </a:solidFill>
+              </a:rPr>
+              <a:t>php</a:t>
+            </a:r>
+            <a:endParaRPr lang="en-US" b="1" dirty="0">
+              <a:solidFill>
+                <a:srgbClr val="FF0000"/>
+              </a:solidFill>
+            </a:endParaRPr>
+          </a:p>
+          <a:p>
+            <a:r>
+              <a:rPr lang="en-US" dirty="0" err="1"/>
+              <a:t>Tambahkan</a:t>
+            </a:r>
+            <a:r>
+              <a:rPr lang="en-US" dirty="0"/>
+              <a:t> </a:t>
+            </a:r>
+            <a:r>
+              <a:rPr lang="en-US" dirty="0" err="1"/>
+              <a:t>baris</a:t>
+            </a:r>
+            <a:r>
+              <a:rPr lang="en-US" dirty="0"/>
+              <a:t> </a:t>
+            </a:r>
+            <a:r>
+              <a:rPr lang="en-US" dirty="0" err="1"/>
+              <a:t>kode</a:t>
+            </a:r>
+            <a:r>
+              <a:rPr lang="en-US" dirty="0"/>
+              <a:t> </a:t>
+            </a:r>
+            <a:r>
+              <a:rPr lang="en-US" dirty="0" err="1"/>
+              <a:t>berikut</a:t>
+            </a:r>
+            <a:endParaRPr lang="en-US" dirty="0"/>
+          </a:p>
+          <a:p>
+            <a:pPr marL="0" indent="0">
+              <a:buNone/>
+            </a:pPr>
+            <a:r>
+              <a:rPr lang="en-US" dirty="0"/>
+              <a:t>	</a:t>
+            </a:r>
+            <a:r>
+              <a:rPr lang="en-US" b="1" dirty="0" smtClean="0">
+                <a:solidFill>
+                  <a:srgbClr val="FF0000"/>
+                </a:solidFill>
+              </a:rPr>
+              <a:t>extension=php_mongodb.dll</a:t>
+            </a:r>
+            <a:endParaRPr lang="en-US" b="1" dirty="0">
+              <a:solidFill>
+                <a:srgbClr val="FF0000"/>
+              </a:solidFill>
+            </a:endParaRPr>
+          </a:p>
+        </p:txBody>
+      </p:sp>
+    </p:spTree>
+    <p:extLst>
+      <p:ext uri="{BB962C8B-B14F-4D97-AF65-F5344CB8AC3E}">
+        <p14:creationId xmlns:p14="http://schemas.microsoft.com/office/powerpoint/2010/main" val="2396231528"/>
+      </p:ext>
+    </p:extLst>
+  </p:cSld>
+  <p:clrMapOvr>
+    <a:masterClrMapping/>
+  </p:clrMapOvr>
+  <p:timing>
+    <p:tnLst>
+      <p:par>
+        <p:cTn id="1" dur="indefinite" restart="never" nodeType="tmRoot"/>
+      </p:par>
+    </p:tnLst>
+  </p:timing>
+</p:sld>
+</file>
+
+<file path=ppt/slides/slide46.xml><?xml version="1.0" encoding="utf-8"?>
+<p:sld xmlns:a="http://schemas.openxmlformats.org/drawingml/2006/main" xmlns:r="http://schemas.openxmlformats.org/officeDocument/2006/relationships" xmlns:p="http://schemas.openxmlformats.org/presentationml/2006/main">
+  <p:cSld>
+    <p:spTree>
+      <p:nvGrpSpPr>
+        <p:cNvPr id="1" name=""/>
+        <p:cNvGrpSpPr/>
+        <p:nvPr/>
+      </p:nvGrpSpPr>
+      <p:grpSpPr>
+        <a:xfrm>
+          <a:off x="0" y="0"/>
+          <a:ext cx="0" cy="0"/>
+          <a:chOff x="0" y="0"/>
+          <a:chExt cx="0" cy="0"/>
+        </a:xfrm>
+      </p:grpSpPr>
+      <p:sp>
+        <p:nvSpPr>
+          <p:cNvPr id="2" name="Title 1"/>
+          <p:cNvSpPr>
+            <a:spLocks noGrp="1"/>
+          </p:cNvSpPr>
+          <p:nvPr>
+            <p:ph type="title"/>
+          </p:nvPr>
+        </p:nvSpPr>
+        <p:spPr/>
+        <p:txBody>
+          <a:bodyPr/>
+          <a:lstStyle/>
+          <a:p>
+            <a:r>
+              <a:rPr lang="en-US" dirty="0" smtClean="0"/>
+              <a:t>Install MongoDB Driver</a:t>
+            </a:r>
+            <a:endParaRPr lang="en-US" dirty="0"/>
+          </a:p>
+        </p:txBody>
+      </p:sp>
+      <p:sp>
+        <p:nvSpPr>
+          <p:cNvPr id="3" name="Content Placeholder 2"/>
+          <p:cNvSpPr>
+            <a:spLocks noGrp="1"/>
+          </p:cNvSpPr>
+          <p:nvPr>
+            <p:ph idx="1"/>
+          </p:nvPr>
+        </p:nvSpPr>
+        <p:spPr/>
+        <p:txBody>
+          <a:bodyPr/>
+          <a:lstStyle/>
+          <a:p>
+            <a:r>
+              <a:rPr lang="en-US" dirty="0"/>
+              <a:t>Restart Apache</a:t>
+            </a:r>
+          </a:p>
+          <a:p>
+            <a:r>
+              <a:rPr lang="en-US" dirty="0" err="1"/>
+              <a:t>Cek</a:t>
+            </a:r>
+            <a:r>
+              <a:rPr lang="en-US" dirty="0"/>
+              <a:t> file </a:t>
+            </a:r>
+            <a:r>
+              <a:rPr lang="en-US" b="1" dirty="0" err="1">
+                <a:solidFill>
+                  <a:srgbClr val="FF0000"/>
+                </a:solidFill>
+              </a:rPr>
+              <a:t>info.php</a:t>
+            </a:r>
+            <a:r>
+              <a:rPr lang="en-US" dirty="0"/>
+              <a:t> di browser </a:t>
+            </a:r>
+            <a:r>
+              <a:rPr lang="en-US" dirty="0" err="1"/>
+              <a:t>kembali</a:t>
+            </a:r>
+            <a:r>
+              <a:rPr lang="en-US" dirty="0"/>
+              <a:t>. </a:t>
+            </a:r>
+            <a:r>
+              <a:rPr lang="en-US" dirty="0" err="1"/>
+              <a:t>Pastikan</a:t>
+            </a:r>
+            <a:r>
+              <a:rPr lang="en-US" dirty="0"/>
+              <a:t> extension MongoDB </a:t>
+            </a:r>
+            <a:r>
+              <a:rPr lang="en-US" dirty="0" err="1"/>
+              <a:t>telah</a:t>
+            </a:r>
+            <a:r>
+              <a:rPr lang="en-US" dirty="0"/>
+              <a:t> </a:t>
+            </a:r>
+            <a:r>
+              <a:rPr lang="en-US" dirty="0" err="1" smtClean="0"/>
+              <a:t>aktif</a:t>
+            </a:r>
+            <a:endParaRPr lang="en-US" dirty="0"/>
+          </a:p>
+        </p:txBody>
+      </p:sp>
+      <p:pic>
+        <p:nvPicPr>
+          <p:cNvPr id="4" name="Picture 3"/>
+          <p:cNvPicPr>
+            <a:picLocks noChangeAspect="1"/>
+          </p:cNvPicPr>
+          <p:nvPr/>
+        </p:nvPicPr>
+        <p:blipFill>
+          <a:blip r:embed="rId2"/>
+          <a:stretch>
+            <a:fillRect/>
+          </a:stretch>
+        </p:blipFill>
+        <p:spPr>
+          <a:xfrm>
+            <a:off x="1588558" y="3269730"/>
+            <a:ext cx="6426200" cy="2758642"/>
+          </a:xfrm>
+          <a:prstGeom prst="rect">
+            <a:avLst/>
+          </a:prstGeom>
+        </p:spPr>
+      </p:pic>
+    </p:spTree>
+    <p:extLst>
+      <p:ext uri="{BB962C8B-B14F-4D97-AF65-F5344CB8AC3E}">
+        <p14:creationId xmlns:p14="http://schemas.microsoft.com/office/powerpoint/2010/main" val="2882407857"/>
+      </p:ext>
+    </p:extLst>
+  </p:cSld>
+  <p:clrMapOvr>
+    <a:masterClrMapping/>
+  </p:clrMapOvr>
+  <p:timing>
+    <p:tnLst>
+      <p:par>
+        <p:cTn id="1" dur="indefinite" restart="never" nodeType="tmRoot"/>
+      </p:par>
+    </p:tnLst>
+  </p:timing>
+</p:sld>
+</file>
+
+<file path=ppt/slides/slide47.xml><?xml version="1.0" encoding="utf-8"?>
+<p:sld xmlns:a="http://schemas.openxmlformats.org/drawingml/2006/main" xmlns:r="http://schemas.openxmlformats.org/officeDocument/2006/relationships" xmlns:p="http://schemas.openxmlformats.org/presentationml/2006/main">
+  <p:cSld>
+    <p:spTree>
+      <p:nvGrpSpPr>
+        <p:cNvPr id="1" name=""/>
+        <p:cNvGrpSpPr/>
+        <p:nvPr/>
+      </p:nvGrpSpPr>
+      <p:grpSpPr>
+        <a:xfrm>
+          <a:off x="0" y="0"/>
+          <a:ext cx="0" cy="0"/>
+          <a:chOff x="0" y="0"/>
+          <a:chExt cx="0" cy="0"/>
+        </a:xfrm>
+      </p:grpSpPr>
+      <p:sp>
+        <p:nvSpPr>
+          <p:cNvPr id="2" name="Title 1"/>
+          <p:cNvSpPr>
+            <a:spLocks noGrp="1"/>
+          </p:cNvSpPr>
+          <p:nvPr>
+            <p:ph type="title"/>
+          </p:nvPr>
+        </p:nvSpPr>
+        <p:spPr/>
+        <p:txBody>
+          <a:bodyPr/>
+          <a:lstStyle/>
+          <a:p>
+            <a:r>
+              <a:rPr lang="en-US" dirty="0" smtClean="0"/>
+              <a:t>Install composer</a:t>
+            </a:r>
+            <a:endParaRPr lang="en-US" dirty="0"/>
+          </a:p>
+        </p:txBody>
+      </p:sp>
+      <p:sp>
+        <p:nvSpPr>
+          <p:cNvPr id="3" name="Content Placeholder 2"/>
+          <p:cNvSpPr>
+            <a:spLocks noGrp="1"/>
+          </p:cNvSpPr>
+          <p:nvPr>
+            <p:ph idx="1"/>
+          </p:nvPr>
+        </p:nvSpPr>
+        <p:spPr/>
+        <p:txBody>
+          <a:bodyPr/>
+          <a:lstStyle/>
+          <a:p>
+            <a:r>
+              <a:rPr lang="en-US" dirty="0">
+                <a:hlinkClick r:id="rId2"/>
+              </a:rPr>
+              <a:t>https://getcomposer.org/</a:t>
+            </a:r>
+            <a:endParaRPr lang="en-US" dirty="0"/>
+          </a:p>
+        </p:txBody>
+      </p:sp>
+    </p:spTree>
+    <p:extLst>
+      <p:ext uri="{BB962C8B-B14F-4D97-AF65-F5344CB8AC3E}">
+        <p14:creationId xmlns:p14="http://schemas.microsoft.com/office/powerpoint/2010/main" val="4058217212"/>
+      </p:ext>
+    </p:extLst>
+  </p:cSld>
+  <p:clrMapOvr>
+    <a:masterClrMapping/>
+  </p:clrMapOvr>
+  <p:timing>
+    <p:tnLst>
+      <p:par>
+        <p:cTn id="1" dur="indefinite" restart="never" nodeType="tmRoot"/>
+      </p:par>
+    </p:tnLst>
+  </p:timing>
+</p:sld>
+</file>
+
+<file path=ppt/slides/slide48.xml><?xml version="1.0" encoding="utf-8"?>
+<p:sld xmlns:a="http://schemas.openxmlformats.org/drawingml/2006/main" xmlns:r="http://schemas.openxmlformats.org/officeDocument/2006/relationships" xmlns:p="http://schemas.openxmlformats.org/presentationml/2006/main">
+  <p:cSld>
+    <p:spTree>
+      <p:nvGrpSpPr>
+        <p:cNvPr id="1" name=""/>
+        <p:cNvGrpSpPr/>
+        <p:nvPr/>
+      </p:nvGrpSpPr>
+      <p:grpSpPr>
+        <a:xfrm>
+          <a:off x="0" y="0"/>
+          <a:ext cx="0" cy="0"/>
+          <a:chOff x="0" y="0"/>
+          <a:chExt cx="0" cy="0"/>
+        </a:xfrm>
+      </p:grpSpPr>
+      <p:sp>
+        <p:nvSpPr>
+          <p:cNvPr id="2" name="Title 1"/>
+          <p:cNvSpPr>
+            <a:spLocks noGrp="1"/>
+          </p:cNvSpPr>
+          <p:nvPr>
+            <p:ph type="title"/>
+          </p:nvPr>
+        </p:nvSpPr>
+        <p:spPr/>
+        <p:txBody>
+          <a:bodyPr/>
+          <a:lstStyle/>
+          <a:p>
+            <a:r>
+              <a:rPr lang="en-US" dirty="0" smtClean="0"/>
+              <a:t>Create Project</a:t>
+            </a:r>
+            <a:endParaRPr lang="en-US" dirty="0"/>
+          </a:p>
+        </p:txBody>
+      </p:sp>
+      <p:sp>
+        <p:nvSpPr>
+          <p:cNvPr id="3" name="Content Placeholder 2"/>
+          <p:cNvSpPr>
+            <a:spLocks noGrp="1"/>
+          </p:cNvSpPr>
+          <p:nvPr>
+            <p:ph idx="1"/>
+          </p:nvPr>
+        </p:nvSpPr>
+        <p:spPr/>
+        <p:txBody>
+          <a:bodyPr/>
+          <a:lstStyle/>
+          <a:p>
+            <a:r>
+              <a:rPr lang="en-US" dirty="0" err="1" smtClean="0"/>
+              <a:t>Buat</a:t>
+            </a:r>
+            <a:r>
+              <a:rPr lang="en-US" dirty="0" smtClean="0"/>
+              <a:t> folder </a:t>
+            </a:r>
+            <a:r>
+              <a:rPr lang="en-US" dirty="0" err="1" smtClean="0"/>
+              <a:t>baru</a:t>
+            </a:r>
+            <a:r>
+              <a:rPr lang="en-US" dirty="0" smtClean="0"/>
+              <a:t> di </a:t>
+            </a:r>
+            <a:r>
+              <a:rPr lang="en-US" b="1" dirty="0" err="1" smtClean="0">
+                <a:solidFill>
+                  <a:srgbClr val="FF0000"/>
+                </a:solidFill>
+              </a:rPr>
+              <a:t>xampp</a:t>
+            </a:r>
+            <a:r>
+              <a:rPr lang="en-US" b="1" dirty="0" smtClean="0">
+                <a:solidFill>
+                  <a:srgbClr val="FF0000"/>
+                </a:solidFill>
+              </a:rPr>
+              <a:t>\</a:t>
+            </a:r>
+            <a:r>
+              <a:rPr lang="en-US" b="1" dirty="0" err="1" smtClean="0">
+                <a:solidFill>
+                  <a:srgbClr val="FF0000"/>
+                </a:solidFill>
+              </a:rPr>
+              <a:t>htdocs</a:t>
+            </a:r>
+            <a:endParaRPr lang="en-US" b="1" dirty="0" smtClean="0">
+              <a:solidFill>
+                <a:srgbClr val="FF0000"/>
+              </a:solidFill>
+            </a:endParaRPr>
+          </a:p>
+          <a:p>
+            <a:r>
+              <a:rPr lang="en-US" dirty="0" err="1" smtClean="0"/>
+              <a:t>Jalankan</a:t>
+            </a:r>
+            <a:r>
+              <a:rPr lang="en-US" dirty="0" smtClean="0"/>
+              <a:t> command prompt </a:t>
+            </a:r>
+            <a:r>
+              <a:rPr lang="en-US" dirty="0" err="1" smtClean="0"/>
+              <a:t>dan</a:t>
+            </a:r>
+            <a:r>
+              <a:rPr lang="en-US" dirty="0" smtClean="0"/>
+              <a:t> </a:t>
+            </a:r>
+            <a:r>
+              <a:rPr lang="en-US" dirty="0" err="1" smtClean="0"/>
+              <a:t>masuk</a:t>
+            </a:r>
+            <a:r>
+              <a:rPr lang="en-US" dirty="0" smtClean="0"/>
+              <a:t> </a:t>
+            </a:r>
+            <a:r>
+              <a:rPr lang="en-US" dirty="0" err="1" smtClean="0"/>
+              <a:t>ke</a:t>
+            </a:r>
+            <a:r>
+              <a:rPr lang="en-US" dirty="0" smtClean="0"/>
+              <a:t> folder </a:t>
+            </a:r>
+            <a:r>
+              <a:rPr lang="en-US" dirty="0" err="1" smtClean="0"/>
+              <a:t>tersebut</a:t>
+            </a:r>
+            <a:endParaRPr lang="en-US" dirty="0" smtClean="0"/>
+          </a:p>
+          <a:p>
+            <a:r>
+              <a:rPr lang="en-US" dirty="0" smtClean="0"/>
+              <a:t>Install MongoDB Library</a:t>
+            </a:r>
+          </a:p>
+          <a:p>
+            <a:pPr lvl="1"/>
+            <a:r>
+              <a:rPr lang="en-US" b="1" dirty="0">
+                <a:solidFill>
+                  <a:srgbClr val="FF0000"/>
+                </a:solidFill>
+              </a:rPr>
+              <a:t>c</a:t>
+            </a:r>
+            <a:r>
+              <a:rPr lang="en-US" b="1" dirty="0" smtClean="0">
+                <a:solidFill>
+                  <a:srgbClr val="FF0000"/>
+                </a:solidFill>
+              </a:rPr>
+              <a:t>omposer require </a:t>
+            </a:r>
+            <a:r>
+              <a:rPr lang="en-US" b="1" dirty="0" err="1" smtClean="0">
+                <a:solidFill>
+                  <a:srgbClr val="FF0000"/>
+                </a:solidFill>
+              </a:rPr>
+              <a:t>mongodb</a:t>
+            </a:r>
+            <a:r>
+              <a:rPr lang="en-US" b="1" dirty="0" smtClean="0">
+                <a:solidFill>
+                  <a:srgbClr val="FF0000"/>
+                </a:solidFill>
+              </a:rPr>
+              <a:t>/</a:t>
+            </a:r>
+            <a:r>
+              <a:rPr lang="en-US" b="1" dirty="0" err="1" smtClean="0">
+                <a:solidFill>
+                  <a:srgbClr val="FF0000"/>
+                </a:solidFill>
+              </a:rPr>
+              <a:t>mongodb</a:t>
+            </a:r>
+            <a:endParaRPr lang="en-US" b="1" dirty="0">
+              <a:solidFill>
+                <a:srgbClr val="FF0000"/>
+              </a:solidFill>
+            </a:endParaRPr>
+          </a:p>
+        </p:txBody>
+      </p:sp>
+    </p:spTree>
+    <p:extLst>
+      <p:ext uri="{BB962C8B-B14F-4D97-AF65-F5344CB8AC3E}">
+        <p14:creationId xmlns:p14="http://schemas.microsoft.com/office/powerpoint/2010/main" val="2281329131"/>
+      </p:ext>
+    </p:extLst>
+  </p:cSld>
+  <p:clrMapOvr>
+    <a:masterClrMapping/>
+  </p:clrMapOvr>
+  <p:timing>
+    <p:tnLst>
+      <p:par>
+        <p:cTn id="1" dur="indefinite" restart="never" nodeType="tmRoot"/>
+      </p:par>
+    </p:tnLst>
+  </p:timing>
+</p:sld>
+</file>
+
+<file path=ppt/slides/slide49.xml><?xml version="1.0" encoding="utf-8"?>
+<p:sld xmlns:a="http://schemas.openxmlformats.org/drawingml/2006/main" xmlns:r="http://schemas.openxmlformats.org/officeDocument/2006/relationships" xmlns:p="http://schemas.openxmlformats.org/presentationml/2006/main">
+  <p:cSld>
+    <p:spTree>
+      <p:nvGrpSpPr>
+        <p:cNvPr id="1" name=""/>
+        <p:cNvGrpSpPr/>
+        <p:nvPr/>
+      </p:nvGrpSpPr>
+      <p:grpSpPr>
+        <a:xfrm>
+          <a:off x="0" y="0"/>
+          <a:ext cx="0" cy="0"/>
+          <a:chOff x="0" y="0"/>
+          <a:chExt cx="0" cy="0"/>
+        </a:xfrm>
+      </p:grpSpPr>
       <p:pic>
         <p:nvPicPr>
           <p:cNvPr id="18" name="Picture 17">
             <a:extLst>
               <a:ext uri="{FF2B5EF4-FFF2-40B4-BE49-F238E27FC236}">
-                <a16:creationId xmlns:a16="http://schemas.microsoft.com/office/drawing/2014/main" xmlns="" id="{088EDB95-D57D-43D6-839D-F21AFB3EFF21}"/>
+                <a16:creationId xmlns="" xmlns:a16="http://schemas.microsoft.com/office/drawing/2014/main" id="{088EDB95-D57D-43D6-839D-F21AFB3EFF21}"/>
               </a:ext>
             </a:extLst>
           </p:cNvPr>
@@ -11697,7 +12971,7 @@
           <p:cNvPr id="6" name="Group 5">
             <a:extLst>
               <a:ext uri="{FF2B5EF4-FFF2-40B4-BE49-F238E27FC236}">
-                <a16:creationId xmlns:a16="http://schemas.microsoft.com/office/drawing/2014/main" xmlns="" id="{539FCA66-5646-4B0E-8DAB-6A9D8EC1C265}"/>
+                <a16:creationId xmlns="" xmlns:a16="http://schemas.microsoft.com/office/drawing/2014/main" id="{539FCA66-5646-4B0E-8DAB-6A9D8EC1C265}"/>
               </a:ext>
             </a:extLst>
           </p:cNvPr>
@@ -11717,7 +12991,7 @@
             <p:cNvPr id="7" name="Picture 6">
               <a:extLst>
                 <a:ext uri="{FF2B5EF4-FFF2-40B4-BE49-F238E27FC236}">
-                  <a16:creationId xmlns:a16="http://schemas.microsoft.com/office/drawing/2014/main" xmlns="" id="{5C0680D9-1347-439D-B54E-62825519D7D8}"/>
+                  <a16:creationId xmlns="" xmlns:a16="http://schemas.microsoft.com/office/drawing/2014/main" id="{5C0680D9-1347-439D-B54E-62825519D7D8}"/>
                 </a:ext>
               </a:extLst>
             </p:cNvPr>
@@ -11753,7 +13027,7 @@
             <p:cNvPr id="8" name="Picture 7">
               <a:extLst>
                 <a:ext uri="{FF2B5EF4-FFF2-40B4-BE49-F238E27FC236}">
-                  <a16:creationId xmlns:a16="http://schemas.microsoft.com/office/drawing/2014/main" xmlns="" id="{A4A983BD-FDF3-467D-B6FC-5262B2783492}"/>
+                  <a16:creationId xmlns="" xmlns:a16="http://schemas.microsoft.com/office/drawing/2014/main" id="{A4A983BD-FDF3-467D-B6FC-5262B2783492}"/>
                 </a:ext>
               </a:extLst>
             </p:cNvPr>
@@ -11789,7 +13063,7 @@
             <p:cNvPr id="9" name="Picture 8">
               <a:extLst>
                 <a:ext uri="{FF2B5EF4-FFF2-40B4-BE49-F238E27FC236}">
-                  <a16:creationId xmlns:a16="http://schemas.microsoft.com/office/drawing/2014/main" xmlns="" id="{974C9ED1-F614-40B7-B987-364331AEA7A1}"/>
+                  <a16:creationId xmlns="" xmlns:a16="http://schemas.microsoft.com/office/drawing/2014/main" id="{974C9ED1-F614-40B7-B987-364331AEA7A1}"/>
                 </a:ext>
               </a:extLst>
             </p:cNvPr>
@@ -11825,7 +13099,7 @@
             <p:cNvPr id="10" name="Title 1">
               <a:extLst>
                 <a:ext uri="{FF2B5EF4-FFF2-40B4-BE49-F238E27FC236}">
-                  <a16:creationId xmlns:a16="http://schemas.microsoft.com/office/drawing/2014/main" xmlns="" id="{1D067117-5FDC-4612-B064-B663709B1833}"/>
+                  <a16:creationId xmlns="" xmlns:a16="http://schemas.microsoft.com/office/drawing/2014/main" id="{1D067117-5FDC-4612-B064-B663709B1833}"/>
                 </a:ext>
               </a:extLst>
             </p:cNvPr>
@@ -11895,7 +13169,7 @@
             <p:cNvPr id="11" name="Title 1">
               <a:extLst>
                 <a:ext uri="{FF2B5EF4-FFF2-40B4-BE49-F238E27FC236}">
-                  <a16:creationId xmlns:a16="http://schemas.microsoft.com/office/drawing/2014/main" xmlns="" id="{1836F539-354E-46E3-8616-C5F4B6531B84}"/>
+                  <a16:creationId xmlns="" xmlns:a16="http://schemas.microsoft.com/office/drawing/2014/main" id="{1836F539-354E-46E3-8616-C5F4B6531B84}"/>
                 </a:ext>
               </a:extLst>
             </p:cNvPr>
@@ -11965,7 +13239,7 @@
             <p:cNvPr id="12" name="Title 1">
               <a:extLst>
                 <a:ext uri="{FF2B5EF4-FFF2-40B4-BE49-F238E27FC236}">
-                  <a16:creationId xmlns:a16="http://schemas.microsoft.com/office/drawing/2014/main" xmlns="" id="{01C47935-32DD-4412-BB89-98F47C0CF21E}"/>
+                  <a16:creationId xmlns="" xmlns:a16="http://schemas.microsoft.com/office/drawing/2014/main" id="{01C47935-32DD-4412-BB89-98F47C0CF21E}"/>
                 </a:ext>
               </a:extLst>
             </p:cNvPr>
@@ -12035,7 +13309,7 @@
             <p:cNvPr id="13" name="Picture 12">
               <a:extLst>
                 <a:ext uri="{FF2B5EF4-FFF2-40B4-BE49-F238E27FC236}">
-                  <a16:creationId xmlns:a16="http://schemas.microsoft.com/office/drawing/2014/main" xmlns="" id="{CDCACA51-C325-4023-9C88-859ACDFAD9DE}"/>
+                  <a16:creationId xmlns="" xmlns:a16="http://schemas.microsoft.com/office/drawing/2014/main" id="{CDCACA51-C325-4023-9C88-859ACDFAD9DE}"/>
                 </a:ext>
               </a:extLst>
             </p:cNvPr>
@@ -12071,7 +13345,7 @@
             <p:cNvPr id="14" name="Title 1">
               <a:extLst>
                 <a:ext uri="{FF2B5EF4-FFF2-40B4-BE49-F238E27FC236}">
-                  <a16:creationId xmlns:a16="http://schemas.microsoft.com/office/drawing/2014/main" xmlns="" id="{AB5299A3-9580-4C35-8ACF-51B39D383A60}"/>
+                  <a16:creationId xmlns="" xmlns:a16="http://schemas.microsoft.com/office/drawing/2014/main" id="{AB5299A3-9580-4C35-8ACF-51B39D383A60}"/>
                 </a:ext>
               </a:extLst>
             </p:cNvPr>
@@ -12142,7 +13416,7 @@
           <p:cNvPr id="15" name="Title 1">
             <a:extLst>
               <a:ext uri="{FF2B5EF4-FFF2-40B4-BE49-F238E27FC236}">
-                <a16:creationId xmlns:a16="http://schemas.microsoft.com/office/drawing/2014/main" xmlns="" id="{15B4ECB2-1EA2-45BD-A1C4-83B0C6BDA2C2}"/>
+                <a16:creationId xmlns="" xmlns:a16="http://schemas.microsoft.com/office/drawing/2014/main" id="{15B4ECB2-1EA2-45BD-A1C4-83B0C6BDA2C2}"/>
               </a:ext>
             </a:extLst>
           </p:cNvPr>
@@ -12212,7 +13486,7 @@
           <p:cNvPr id="16" name="Picture 15">
             <a:extLst>
               <a:ext uri="{FF2B5EF4-FFF2-40B4-BE49-F238E27FC236}">
-                <a16:creationId xmlns:a16="http://schemas.microsoft.com/office/drawing/2014/main" xmlns="" id="{09ECE9BA-4A57-4C40-8543-79ADE3BA9D81}"/>
+                <a16:creationId xmlns="" xmlns:a16="http://schemas.microsoft.com/office/drawing/2014/main" id="{09ECE9BA-4A57-4C40-8543-79ADE3BA9D81}"/>
               </a:ext>
             </a:extLst>
           </p:cNvPr>
@@ -12247,7 +13521,7 @@
           <p:cNvPr id="17" name="Rectangle 16">
             <a:extLst>
               <a:ext uri="{FF2B5EF4-FFF2-40B4-BE49-F238E27FC236}">
-                <a16:creationId xmlns:a16="http://schemas.microsoft.com/office/drawing/2014/main" xmlns="" id="{FE69A50C-EA9B-47A2-B1B3-8D385A77FE0F}"/>
+                <a16:creationId xmlns="" xmlns:a16="http://schemas.microsoft.com/office/drawing/2014/main" id="{FE69A50C-EA9B-47A2-B1B3-8D385A77FE0F}"/>
               </a:ext>
             </a:extLst>
           </p:cNvPr>
@@ -12523,7 +13797,7 @@
           <p:cNvPr id="20" name="Group 19">
             <a:extLst>
               <a:ext uri="{FF2B5EF4-FFF2-40B4-BE49-F238E27FC236}">
-                <a16:creationId xmlns:a16="http://schemas.microsoft.com/office/drawing/2014/main" xmlns="" id="{AD8B2030-99C4-4505-9667-DE6CE4B6CE0B}"/>
+                <a16:creationId xmlns="" xmlns:a16="http://schemas.microsoft.com/office/drawing/2014/main" id="{AD8B2030-99C4-4505-9667-DE6CE4B6CE0B}"/>
               </a:ext>
             </a:extLst>
           </p:cNvPr>
@@ -12543,7 +13817,7 @@
             <p:cNvPr id="21" name="Picture 20">
               <a:extLst>
                 <a:ext uri="{FF2B5EF4-FFF2-40B4-BE49-F238E27FC236}">
-                  <a16:creationId xmlns:a16="http://schemas.microsoft.com/office/drawing/2014/main" xmlns="" id="{9587EFBD-0C26-4194-996D-1BA694E97DCD}"/>
+                  <a16:creationId xmlns="" xmlns:a16="http://schemas.microsoft.com/office/drawing/2014/main" id="{9587EFBD-0C26-4194-996D-1BA694E97DCD}"/>
                 </a:ext>
               </a:extLst>
             </p:cNvPr>
@@ -12579,7 +13853,7 @@
             <p:cNvPr id="22" name="Title 1">
               <a:extLst>
                 <a:ext uri="{FF2B5EF4-FFF2-40B4-BE49-F238E27FC236}">
-                  <a16:creationId xmlns:a16="http://schemas.microsoft.com/office/drawing/2014/main" xmlns="" id="{D2C9E095-20A3-45B6-B340-94169BBF4AC4}"/>
+                  <a16:creationId xmlns="" xmlns:a16="http://schemas.microsoft.com/office/drawing/2014/main" id="{D2C9E095-20A3-45B6-B340-94169BBF4AC4}"/>
                 </a:ext>
               </a:extLst>
             </p:cNvPr>
@@ -12687,7 +13961,7 @@
           <p:cNvPr id="2" name="Title 1">
             <a:extLst>
               <a:ext uri="{FF2B5EF4-FFF2-40B4-BE49-F238E27FC236}">
-                <a16:creationId xmlns:a16="http://schemas.microsoft.com/office/drawing/2014/main" xmlns="" id="{3C8729D5-9B33-4B14-88D7-23ABC225B4EA}"/>
+                <a16:creationId xmlns="" xmlns:a16="http://schemas.microsoft.com/office/drawing/2014/main" id="{3C8729D5-9B33-4B14-88D7-23ABC225B4EA}"/>
               </a:ext>
             </a:extLst>
           </p:cNvPr>
@@ -12718,7 +13992,7 @@
           <p:cNvPr id="3" name="Content Placeholder 2">
             <a:extLst>
               <a:ext uri="{FF2B5EF4-FFF2-40B4-BE49-F238E27FC236}">
-                <a16:creationId xmlns:a16="http://schemas.microsoft.com/office/drawing/2014/main" xmlns="" id="{48834A63-F3A7-423F-A603-63A7DFF714BE}"/>
+                <a16:creationId xmlns="" xmlns:a16="http://schemas.microsoft.com/office/drawing/2014/main" id="{48834A63-F3A7-423F-A603-63A7DFF714BE}"/>
               </a:ext>
             </a:extLst>
           </p:cNvPr>
@@ -12838,7 +14112,7 @@
           <p:cNvPr id="2" name="Title 1">
             <a:extLst>
               <a:ext uri="{FF2B5EF4-FFF2-40B4-BE49-F238E27FC236}">
-                <a16:creationId xmlns:a16="http://schemas.microsoft.com/office/drawing/2014/main" xmlns="" id="{0D36E976-01F8-4955-B58D-6F968587BDE9}"/>
+                <a16:creationId xmlns="" xmlns:a16="http://schemas.microsoft.com/office/drawing/2014/main" id="{0D36E976-01F8-4955-B58D-6F968587BDE9}"/>
               </a:ext>
             </a:extLst>
           </p:cNvPr>
@@ -12869,7 +14143,7 @@
           <p:cNvPr id="3" name="Content Placeholder 2">
             <a:extLst>
               <a:ext uri="{FF2B5EF4-FFF2-40B4-BE49-F238E27FC236}">
-                <a16:creationId xmlns:a16="http://schemas.microsoft.com/office/drawing/2014/main" xmlns="" id="{37AEF5D0-1B91-4234-9D70-35AB5D8074CF}"/>
+                <a16:creationId xmlns="" xmlns:a16="http://schemas.microsoft.com/office/drawing/2014/main" id="{37AEF5D0-1B91-4234-9D70-35AB5D8074CF}"/>
               </a:ext>
             </a:extLst>
           </p:cNvPr>
@@ -13009,7 +14283,7 @@
           <p:cNvPr id="2" name="Title 1">
             <a:extLst>
               <a:ext uri="{FF2B5EF4-FFF2-40B4-BE49-F238E27FC236}">
-                <a16:creationId xmlns:a16="http://schemas.microsoft.com/office/drawing/2014/main" xmlns="" id="{2EC2ABC9-7CDB-4209-B050-269D7CCD7DAD}"/>
+                <a16:creationId xmlns="" xmlns:a16="http://schemas.microsoft.com/office/drawing/2014/main" id="{2EC2ABC9-7CDB-4209-B050-269D7CCD7DAD}"/>
               </a:ext>
             </a:extLst>
           </p:cNvPr>
@@ -13037,7 +14311,7 @@
           <p:cNvPr id="5" name="Content Placeholder 4" descr="A screenshot of a cell phone&#10;&#10;Description automatically generated">
             <a:extLst>
               <a:ext uri="{FF2B5EF4-FFF2-40B4-BE49-F238E27FC236}">
-                <a16:creationId xmlns:a16="http://schemas.microsoft.com/office/drawing/2014/main" xmlns="" id="{D783A7C2-DB8E-4E77-9B5B-2447534A16EB}"/>
+                <a16:creationId xmlns="" xmlns:a16="http://schemas.microsoft.com/office/drawing/2014/main" id="{D783A7C2-DB8E-4E77-9B5B-2447534A16EB}"/>
               </a:ext>
             </a:extLst>
           </p:cNvPr>
@@ -13109,7 +14383,7 @@
           <p:cNvPr id="2" name="Title 1">
             <a:extLst>
               <a:ext uri="{FF2B5EF4-FFF2-40B4-BE49-F238E27FC236}">
-                <a16:creationId xmlns:a16="http://schemas.microsoft.com/office/drawing/2014/main" xmlns="" id="{86721FB0-3D46-4967-8EA9-E6BC5B2F0D15}"/>
+                <a16:creationId xmlns="" xmlns:a16="http://schemas.microsoft.com/office/drawing/2014/main" id="{86721FB0-3D46-4967-8EA9-E6BC5B2F0D15}"/>
               </a:ext>
             </a:extLst>
           </p:cNvPr>
@@ -13137,7 +14411,7 @@
           <p:cNvPr id="5" name="Content Placeholder 4" descr="A close up of a sign&#10;&#10;Description automatically generated">
             <a:extLst>
               <a:ext uri="{FF2B5EF4-FFF2-40B4-BE49-F238E27FC236}">
-                <a16:creationId xmlns:a16="http://schemas.microsoft.com/office/drawing/2014/main" xmlns="" id="{DCE7AE36-905F-4E0D-ADAB-1E4521540E6D}"/>
+                <a16:creationId xmlns="" xmlns:a16="http://schemas.microsoft.com/office/drawing/2014/main" id="{DCE7AE36-905F-4E0D-ADAB-1E4521540E6D}"/>
               </a:ext>
             </a:extLst>
           </p:cNvPr>
@@ -13209,7 +14483,7 @@
           <p:cNvPr id="2" name="Title 1">
             <a:extLst>
               <a:ext uri="{FF2B5EF4-FFF2-40B4-BE49-F238E27FC236}">
-                <a16:creationId xmlns:a16="http://schemas.microsoft.com/office/drawing/2014/main" xmlns="" id="{09648B3B-7DB1-4DDC-BFC4-E6BAC8CAE0BF}"/>
+                <a16:creationId xmlns="" xmlns:a16="http://schemas.microsoft.com/office/drawing/2014/main" id="{09648B3B-7DB1-4DDC-BFC4-E6BAC8CAE0BF}"/>
               </a:ext>
             </a:extLst>
           </p:cNvPr>
@@ -13237,7 +14511,7 @@
           <p:cNvPr id="3" name="Content Placeholder 2">
             <a:extLst>
               <a:ext uri="{FF2B5EF4-FFF2-40B4-BE49-F238E27FC236}">
-                <a16:creationId xmlns:a16="http://schemas.microsoft.com/office/drawing/2014/main" xmlns="" id="{33211968-DEF5-4C17-89E6-A85366CB3BEE}"/>
+                <a16:creationId xmlns="" xmlns:a16="http://schemas.microsoft.com/office/drawing/2014/main" id="{33211968-DEF5-4C17-89E6-A85366CB3BEE}"/>
               </a:ext>
             </a:extLst>
           </p:cNvPr>

</xml_diff>